<commit_message>
Projeto Bradoo - Documentação
</commit_message>
<xml_diff>
--- a/documentos/Bradoo - Proptipo de Tela V3 - 20190625.pptx
+++ b/documentos/Bradoo - Proptipo de Tela V3 - 20190625.pptx
@@ -1206,7 +1206,7 @@
           <a:p>
             <a:fld id="{0C5B8093-CA25-4743-A97F-002A381C161A}" type="datetimeFigureOut">
               <a:rPr lang="pt-BR" smtClean="0"/>
-              <a:t>27/06/2019</a:t>
+              <a:t>03/07/2019</a:t>
             </a:fld>
             <a:endParaRPr lang="pt-BR"/>
           </a:p>
@@ -1404,7 +1404,7 @@
           <a:p>
             <a:fld id="{0C5B8093-CA25-4743-A97F-002A381C161A}" type="datetimeFigureOut">
               <a:rPr lang="pt-BR" smtClean="0"/>
-              <a:t>27/06/2019</a:t>
+              <a:t>03/07/2019</a:t>
             </a:fld>
             <a:endParaRPr lang="pt-BR"/>
           </a:p>
@@ -1612,7 +1612,7 @@
           <a:p>
             <a:fld id="{0C5B8093-CA25-4743-A97F-002A381C161A}" type="datetimeFigureOut">
               <a:rPr lang="pt-BR" smtClean="0"/>
-              <a:t>27/06/2019</a:t>
+              <a:t>03/07/2019</a:t>
             </a:fld>
             <a:endParaRPr lang="pt-BR"/>
           </a:p>
@@ -1810,7 +1810,7 @@
           <a:p>
             <a:fld id="{0C5B8093-CA25-4743-A97F-002A381C161A}" type="datetimeFigureOut">
               <a:rPr lang="pt-BR" smtClean="0"/>
-              <a:t>27/06/2019</a:t>
+              <a:t>03/07/2019</a:t>
             </a:fld>
             <a:endParaRPr lang="pt-BR"/>
           </a:p>
@@ -2085,7 +2085,7 @@
           <a:p>
             <a:fld id="{0C5B8093-CA25-4743-A97F-002A381C161A}" type="datetimeFigureOut">
               <a:rPr lang="pt-BR" smtClean="0"/>
-              <a:t>27/06/2019</a:t>
+              <a:t>03/07/2019</a:t>
             </a:fld>
             <a:endParaRPr lang="pt-BR"/>
           </a:p>
@@ -2350,7 +2350,7 @@
           <a:p>
             <a:fld id="{0C5B8093-CA25-4743-A97F-002A381C161A}" type="datetimeFigureOut">
               <a:rPr lang="pt-BR" smtClean="0"/>
-              <a:t>27/06/2019</a:t>
+              <a:t>03/07/2019</a:t>
             </a:fld>
             <a:endParaRPr lang="pt-BR"/>
           </a:p>
@@ -2762,7 +2762,7 @@
           <a:p>
             <a:fld id="{0C5B8093-CA25-4743-A97F-002A381C161A}" type="datetimeFigureOut">
               <a:rPr lang="pt-BR" smtClean="0"/>
-              <a:t>27/06/2019</a:t>
+              <a:t>03/07/2019</a:t>
             </a:fld>
             <a:endParaRPr lang="pt-BR"/>
           </a:p>
@@ -2903,7 +2903,7 @@
           <a:p>
             <a:fld id="{0C5B8093-CA25-4743-A97F-002A381C161A}" type="datetimeFigureOut">
               <a:rPr lang="pt-BR" smtClean="0"/>
-              <a:t>27/06/2019</a:t>
+              <a:t>03/07/2019</a:t>
             </a:fld>
             <a:endParaRPr lang="pt-BR"/>
           </a:p>
@@ -3016,7 +3016,7 @@
           <a:p>
             <a:fld id="{0C5B8093-CA25-4743-A97F-002A381C161A}" type="datetimeFigureOut">
               <a:rPr lang="pt-BR" smtClean="0"/>
-              <a:t>27/06/2019</a:t>
+              <a:t>03/07/2019</a:t>
             </a:fld>
             <a:endParaRPr lang="pt-BR"/>
           </a:p>
@@ -3327,7 +3327,7 @@
           <a:p>
             <a:fld id="{0C5B8093-CA25-4743-A97F-002A381C161A}" type="datetimeFigureOut">
               <a:rPr lang="pt-BR" smtClean="0"/>
-              <a:t>27/06/2019</a:t>
+              <a:t>03/07/2019</a:t>
             </a:fld>
             <a:endParaRPr lang="pt-BR"/>
           </a:p>
@@ -3615,7 +3615,7 @@
           <a:p>
             <a:fld id="{0C5B8093-CA25-4743-A97F-002A381C161A}" type="datetimeFigureOut">
               <a:rPr lang="pt-BR" smtClean="0"/>
-              <a:t>27/06/2019</a:t>
+              <a:t>03/07/2019</a:t>
             </a:fld>
             <a:endParaRPr lang="pt-BR"/>
           </a:p>
@@ -3856,7 +3856,7 @@
           <a:p>
             <a:fld id="{0C5B8093-CA25-4743-A97F-002A381C161A}" type="datetimeFigureOut">
               <a:rPr lang="pt-BR" smtClean="0"/>
-              <a:t>27/06/2019</a:t>
+              <a:t>03/07/2019</a:t>
             </a:fld>
             <a:endParaRPr lang="pt-BR"/>
           </a:p>
@@ -6439,7 +6439,7 @@
         <p:spPr>
           <a:xfrm>
             <a:off x="5974974" y="148803"/>
-            <a:ext cx="5892835" cy="6186309"/>
+            <a:ext cx="5892835" cy="4524315"/>
           </a:xfrm>
           <a:prstGeom prst="rect">
             <a:avLst/>
@@ -6458,7 +6458,7 @@
           <a:lstStyle/>
           <a:p>
             <a:r>
-              <a:rPr lang="pt-BR" b="1" dirty="0">
+              <a:rPr lang="pt-BR" sz="1200" b="1" dirty="0">
                 <a:solidFill>
                   <a:srgbClr val="FF0000"/>
                 </a:solidFill>
@@ -6467,7 +6467,7 @@
             </a:r>
           </a:p>
           <a:p>
-            <a:endParaRPr lang="pt-BR" dirty="0">
+            <a:endParaRPr lang="pt-BR" sz="1200" dirty="0">
               <a:solidFill>
                 <a:srgbClr val="FF0000"/>
               </a:solidFill>
@@ -6478,20 +6478,48 @@
               <a:buAutoNum type="arabicParenR"/>
             </a:pPr>
             <a:r>
-              <a:rPr lang="pt-BR" dirty="0">
-                <a:solidFill>
-                  <a:srgbClr val="FF0000"/>
-                </a:solidFill>
-              </a:rPr>
-              <a:t>Mudar título da tela para “Criar Instância”</a:t>
-            </a:r>
+              <a:rPr lang="pt-BR" sz="1200" dirty="0">
+                <a:solidFill>
+                  <a:srgbClr val="FF0000"/>
+                </a:solidFill>
+              </a:rPr>
+              <a:t>Mudar título da tela para “Criar Instância</a:t>
+            </a:r>
+            <a:r>
+              <a:rPr lang="pt-BR" sz="1200" dirty="0" smtClean="0">
+                <a:solidFill>
+                  <a:srgbClr val="FF0000"/>
+                </a:solidFill>
+              </a:rPr>
+              <a:t>”</a:t>
+            </a:r>
+            <a:br>
+              <a:rPr lang="pt-BR" sz="1200" dirty="0" smtClean="0">
+                <a:solidFill>
+                  <a:srgbClr val="FF0000"/>
+                </a:solidFill>
+              </a:rPr>
+            </a:br>
+            <a:r>
+              <a:rPr lang="pt-BR" sz="1200" dirty="0" smtClean="0">
+                <a:solidFill>
+                  <a:srgbClr val="00B050"/>
+                </a:solidFill>
+              </a:rPr>
+              <a:t>OK</a:t>
+            </a:r>
+            <a:endParaRPr lang="pt-BR" sz="1200" dirty="0">
+              <a:solidFill>
+                <a:srgbClr val="00B050"/>
+              </a:solidFill>
+            </a:endParaRPr>
           </a:p>
           <a:p>
             <a:pPr marL="342900" indent="-342900">
               <a:buAutoNum type="arabicParenR"/>
             </a:pPr>
             <a:r>
-              <a:rPr lang="pt-BR" dirty="0">
+              <a:rPr lang="pt-BR" sz="1200" dirty="0">
                 <a:solidFill>
                   <a:srgbClr val="FF0000"/>
                 </a:solidFill>
@@ -6499,7 +6527,7 @@
               <a:t>Campos “</a:t>
             </a:r>
             <a:r>
-              <a:rPr lang="pt-BR" b="1" dirty="0">
+              <a:rPr lang="pt-BR" sz="1200" b="1" dirty="0">
                 <a:solidFill>
                   <a:srgbClr val="FF0000"/>
                 </a:solidFill>
@@ -6507,7 +6535,7 @@
               <a:t>Produto</a:t>
             </a:r>
             <a:r>
-              <a:rPr lang="pt-BR" dirty="0">
+              <a:rPr lang="pt-BR" sz="1200" dirty="0">
                 <a:solidFill>
                   <a:srgbClr val="FF0000"/>
                 </a:solidFill>
@@ -6515,7 +6543,7 @@
               <a:t>” e “</a:t>
             </a:r>
             <a:r>
-              <a:rPr lang="pt-BR" b="1" dirty="0">
+              <a:rPr lang="pt-BR" sz="1200" b="1" dirty="0">
                 <a:solidFill>
                   <a:srgbClr val="FF0000"/>
                 </a:solidFill>
@@ -6523,20 +6551,79 @@
               <a:t>Imagem TAG</a:t>
             </a:r>
             <a:r>
-              <a:rPr lang="pt-BR" dirty="0">
-                <a:solidFill>
-                  <a:srgbClr val="FF0000"/>
-                </a:solidFill>
-              </a:rPr>
-              <a:t>” devem ser relacionados, ou seja, só mostrar as imagens que estão cadastradas com o valor informado no campo Produto</a:t>
-            </a:r>
+              <a:rPr lang="pt-BR" sz="1200" dirty="0">
+                <a:solidFill>
+                  <a:srgbClr val="FF0000"/>
+                </a:solidFill>
+              </a:rPr>
+              <a:t>” devem ser relacionados, ou seja, só mostrar as </a:t>
+            </a:r>
+            <a:r>
+              <a:rPr lang="pt-BR" sz="1200" dirty="0" smtClean="0">
+                <a:solidFill>
+                  <a:srgbClr val="FF0000"/>
+                </a:solidFill>
+              </a:rPr>
+              <a:t/>
+            </a:r>
+            <a:br>
+              <a:rPr lang="pt-BR" sz="1200" dirty="0" smtClean="0">
+                <a:solidFill>
+                  <a:srgbClr val="FF0000"/>
+                </a:solidFill>
+              </a:rPr>
+            </a:br>
+            <a:r>
+              <a:rPr lang="pt-BR" sz="1200" dirty="0" smtClean="0">
+                <a:solidFill>
+                  <a:srgbClr val="FF0000"/>
+                </a:solidFill>
+              </a:rPr>
+              <a:t>imagens </a:t>
+            </a:r>
+            <a:r>
+              <a:rPr lang="pt-BR" sz="1200" dirty="0">
+                <a:solidFill>
+                  <a:srgbClr val="FF0000"/>
+                </a:solidFill>
+              </a:rPr>
+              <a:t>que estão cadastradas com o valor informado no campo </a:t>
+            </a:r>
+            <a:r>
+              <a:rPr lang="pt-BR" sz="1200" dirty="0" smtClean="0">
+                <a:solidFill>
+                  <a:srgbClr val="FF0000"/>
+                </a:solidFill>
+              </a:rPr>
+              <a:t>Produto</a:t>
+            </a:r>
+            <a:br>
+              <a:rPr lang="pt-BR" sz="1200" dirty="0" smtClean="0">
+                <a:solidFill>
+                  <a:srgbClr val="FF0000"/>
+                </a:solidFill>
+              </a:rPr>
+            </a:br>
+            <a:r>
+              <a:rPr lang="pt-BR" sz="1200" dirty="0" smtClean="0">
+                <a:solidFill>
+                  <a:srgbClr val="00B050"/>
+                </a:solidFill>
+              </a:rPr>
+              <a:t>OK</a:t>
+            </a:r>
+            <a:endParaRPr lang="pt-BR" sz="1200" dirty="0">
+              <a:solidFill>
+                <a:srgbClr val="00B050"/>
+              </a:solidFill>
+            </a:endParaRPr>
           </a:p>
           <a:p>
             <a:pPr marL="342900" indent="-342900">
               <a:buAutoNum type="arabicParenR"/>
             </a:pPr>
             <a:r>
-              <a:rPr lang="pt-BR" dirty="0">
+              <a:rPr lang="pt-BR" sz="1200" dirty="0">
                 <a:solidFill>
                   <a:srgbClr val="FF0000"/>
                 </a:solidFill>
@@ -6544,7 +6631,7 @@
               <a:t>Remover os campos “</a:t>
             </a:r>
             <a:r>
-              <a:rPr lang="pt-BR" b="1" dirty="0">
+              <a:rPr lang="pt-BR" sz="1200" b="1" dirty="0">
                 <a:solidFill>
                   <a:srgbClr val="FF0000"/>
                 </a:solidFill>
@@ -6552,7 +6639,7 @@
               <a:t>URL </a:t>
             </a:r>
             <a:r>
-              <a:rPr lang="pt-BR" b="1" dirty="0" err="1">
+              <a:rPr lang="pt-BR" sz="1200" b="1" dirty="0" err="1">
                 <a:solidFill>
                   <a:srgbClr val="FF0000"/>
                 </a:solidFill>
@@ -6560,7 +6647,7 @@
               <a:t>Image</a:t>
             </a:r>
             <a:r>
-              <a:rPr lang="pt-BR" dirty="0">
+              <a:rPr lang="pt-BR" sz="1200" dirty="0">
                 <a:solidFill>
                   <a:srgbClr val="FF0000"/>
                 </a:solidFill>
@@ -6568,7 +6655,7 @@
               <a:t>”, “</a:t>
             </a:r>
             <a:r>
-              <a:rPr lang="pt-BR" b="1" dirty="0" err="1">
+              <a:rPr lang="pt-BR" sz="1200" b="1" dirty="0" err="1">
                 <a:solidFill>
                   <a:srgbClr val="FF0000"/>
                 </a:solidFill>
@@ -6576,7 +6663,7 @@
               <a:t>Image</a:t>
             </a:r>
             <a:r>
-              <a:rPr lang="pt-BR" b="1" dirty="0">
+              <a:rPr lang="pt-BR" sz="1200" b="1" dirty="0">
                 <a:solidFill>
                   <a:srgbClr val="FF0000"/>
                 </a:solidFill>
@@ -6584,7 +6671,7 @@
               <a:t> </a:t>
             </a:r>
             <a:r>
-              <a:rPr lang="pt-BR" b="1" dirty="0" err="1">
+              <a:rPr lang="pt-BR" sz="1200" b="1" dirty="0" err="1">
                 <a:solidFill>
                   <a:srgbClr val="FF0000"/>
                 </a:solidFill>
@@ -6592,7 +6679,7 @@
               <a:t>Name</a:t>
             </a:r>
             <a:r>
-              <a:rPr lang="pt-BR" dirty="0">
+              <a:rPr lang="pt-BR" sz="1200" dirty="0">
                 <a:solidFill>
                   <a:srgbClr val="FF0000"/>
                 </a:solidFill>
@@ -6600,7 +6687,7 @@
               <a:t>” e “</a:t>
             </a:r>
             <a:r>
-              <a:rPr lang="pt-BR" b="1" dirty="0">
+              <a:rPr lang="pt-BR" sz="1200" b="1" dirty="0">
                 <a:solidFill>
                   <a:srgbClr val="FF0000"/>
                 </a:solidFill>
@@ -6608,20 +6695,40 @@
               <a:t>Tipo de Banco de Dados</a:t>
             </a:r>
             <a:r>
-              <a:rPr lang="pt-BR" dirty="0">
+              <a:rPr lang="pt-BR" sz="1200" dirty="0" smtClean="0">
                 <a:solidFill>
                   <a:srgbClr val="FF0000"/>
                 </a:solidFill>
               </a:rPr>
               <a:t>”</a:t>
             </a:r>
+            <a:br>
+              <a:rPr lang="pt-BR" sz="1200" dirty="0" smtClean="0">
+                <a:solidFill>
+                  <a:srgbClr val="FF0000"/>
+                </a:solidFill>
+              </a:rPr>
+            </a:br>
+            <a:r>
+              <a:rPr lang="pt-BR" sz="1200" dirty="0" smtClean="0">
+                <a:solidFill>
+                  <a:srgbClr val="00B050"/>
+                </a:solidFill>
+              </a:rPr>
+              <a:t>OK</a:t>
+            </a:r>
+            <a:endParaRPr lang="pt-BR" sz="1200" dirty="0">
+              <a:solidFill>
+                <a:srgbClr val="00B050"/>
+              </a:solidFill>
+            </a:endParaRPr>
           </a:p>
           <a:p>
             <a:pPr marL="342900" indent="-342900">
               <a:buAutoNum type="arabicParenR"/>
             </a:pPr>
             <a:r>
-              <a:rPr lang="pt-BR" dirty="0">
+              <a:rPr lang="pt-BR" sz="1200" dirty="0">
                 <a:solidFill>
                   <a:srgbClr val="FF0000"/>
                 </a:solidFill>
@@ -6635,7 +6742,7 @@
               <a:buChar char="§"/>
             </a:pPr>
             <a:r>
-              <a:rPr lang="pt-BR" dirty="0">
+              <a:rPr lang="pt-BR" sz="1200" dirty="0">
                 <a:solidFill>
                   <a:srgbClr val="FF0000"/>
                 </a:solidFill>
@@ -6644,11 +6751,7 @@
             </a:r>
             <a:r>
               <a:rPr lang="pt-BR" sz="1200" dirty="0"/>
-              <a:t>(Gravar no mongo e apresentar no grid</a:t>
-            </a:r>
-            <a:r>
-              <a:rPr lang="pt-BR" dirty="0"/>
-              <a:t>)</a:t>
+              <a:t>(Gravar no mongo e apresentar no grid)</a:t>
             </a:r>
           </a:p>
           <a:p>
@@ -6657,7 +6760,7 @@
               <a:buChar char="§"/>
             </a:pPr>
             <a:r>
-              <a:rPr lang="pt-BR" dirty="0">
+              <a:rPr lang="pt-BR" sz="1200" dirty="0">
                 <a:solidFill>
                   <a:srgbClr val="FF0000"/>
                 </a:solidFill>
@@ -6675,7 +6778,7 @@
               <a:buChar char="§"/>
             </a:pPr>
             <a:r>
-              <a:rPr lang="pt-BR" dirty="0">
+              <a:rPr lang="pt-BR" sz="1200" dirty="0">
                 <a:solidFill>
                   <a:srgbClr val="FF0000"/>
                 </a:solidFill>
@@ -6683,7 +6786,7 @@
               <a:t>Login (Usuário </a:t>
             </a:r>
             <a:r>
-              <a:rPr lang="pt-BR" dirty="0" err="1">
+              <a:rPr lang="pt-BR" sz="1200" dirty="0" err="1">
                 <a:solidFill>
                   <a:srgbClr val="FF0000"/>
                 </a:solidFill>
@@ -6701,7 +6804,7 @@
               <a:buChar char="§"/>
             </a:pPr>
             <a:r>
-              <a:rPr lang="pt-BR" dirty="0">
+              <a:rPr lang="pt-BR" sz="1200" dirty="0">
                 <a:solidFill>
                   <a:srgbClr val="FF0000"/>
                 </a:solidFill>
@@ -6709,7 +6812,7 @@
               <a:t>Senha (</a:t>
             </a:r>
             <a:r>
-              <a:rPr lang="pt-BR" dirty="0" err="1">
+              <a:rPr lang="pt-BR" sz="1200" dirty="0" err="1">
                 <a:solidFill>
                   <a:srgbClr val="FF0000"/>
                 </a:solidFill>
@@ -6717,7 +6820,7 @@
               <a:t>Usário</a:t>
             </a:r>
             <a:r>
-              <a:rPr lang="pt-BR" dirty="0">
+              <a:rPr lang="pt-BR" sz="1200" dirty="0">
                 <a:solidFill>
                   <a:srgbClr val="FF0000"/>
                 </a:solidFill>
@@ -6725,7 +6828,7 @@
               <a:t> </a:t>
             </a:r>
             <a:r>
-              <a:rPr lang="pt-BR" dirty="0" err="1">
+              <a:rPr lang="pt-BR" sz="1200" dirty="0" err="1">
                 <a:solidFill>
                   <a:srgbClr val="FF0000"/>
                 </a:solidFill>
@@ -6733,7 +6836,7 @@
               <a:t>Odoo</a:t>
             </a:r>
             <a:r>
-              <a:rPr lang="pt-BR" dirty="0">
+              <a:rPr lang="pt-BR" sz="1200" dirty="0">
                 <a:solidFill>
                   <a:srgbClr val="FF0000"/>
                 </a:solidFill>
@@ -6744,7 +6847,6 @@
               <a:rPr lang="pt-BR" sz="1200" dirty="0"/>
               <a:t> (Gravar no mongo e apresentar na tela ao lado)</a:t>
             </a:r>
-            <a:endParaRPr lang="pt-BR" dirty="0"/>
           </a:p>
           <a:p>
             <a:pPr marL="800100" lvl="1" indent="-342900">
@@ -6752,7 +6854,7 @@
               <a:buChar char="§"/>
             </a:pPr>
             <a:r>
-              <a:rPr lang="pt-BR" dirty="0">
+              <a:rPr lang="pt-BR" sz="1200" dirty="0">
                 <a:solidFill>
                   <a:srgbClr val="FF0000"/>
                 </a:solidFill>
@@ -6764,13 +6866,56 @@
               <a:t>(Gravar no mongo e apresentar na tela ao lado)</a:t>
             </a:r>
             <a:r>
-              <a:rPr lang="pt-BR" dirty="0">
+              <a:rPr lang="pt-BR" sz="1200" dirty="0">
                 <a:solidFill>
                   <a:srgbClr val="FF0000"/>
                 </a:solidFill>
               </a:rPr>
               <a:t> </a:t>
             </a:r>
+            <a:endParaRPr lang="pt-BR" sz="1200" dirty="0" smtClean="0">
+              <a:solidFill>
+                <a:srgbClr val="FF0000"/>
+              </a:solidFill>
+            </a:endParaRPr>
+          </a:p>
+          <a:p>
+            <a:pPr marL="800100" lvl="1" indent="-342900">
+              <a:buFont typeface="Wingdings" panose="05000000000000000000" pitchFamily="2" charset="2"/>
+              <a:buChar char="§"/>
+            </a:pPr>
+            <a:endParaRPr lang="pt-BR" sz="1200" dirty="0">
+              <a:solidFill>
+                <a:srgbClr val="FF0000"/>
+              </a:solidFill>
+            </a:endParaRPr>
+          </a:p>
+          <a:p>
+            <a:pPr lvl="1"/>
+            <a:r>
+              <a:rPr lang="pt-BR" sz="1200" dirty="0" smtClean="0">
+                <a:solidFill>
+                  <a:srgbClr val="00B050"/>
+                </a:solidFill>
+              </a:rPr>
+              <a:t>OK</a:t>
+            </a:r>
+            <a:endParaRPr lang="pt-BR" sz="1200" dirty="0">
+              <a:solidFill>
+                <a:srgbClr val="00B050"/>
+              </a:solidFill>
+            </a:endParaRPr>
+          </a:p>
+          <a:p>
+            <a:pPr marL="800100" lvl="1" indent="-342900">
+              <a:buFont typeface="Wingdings" panose="05000000000000000000" pitchFamily="2" charset="2"/>
+              <a:buChar char="§"/>
+            </a:pPr>
+            <a:endParaRPr lang="pt-BR" sz="1200" dirty="0">
+              <a:solidFill>
+                <a:srgbClr val="FF0000"/>
+              </a:solidFill>
+            </a:endParaRPr>
           </a:p>
           <a:p>
             <a:pPr marL="342900" indent="-342900">
@@ -6778,7 +6923,7 @@
               <a:buAutoNum type="arabicPeriod" startAt="5"/>
             </a:pPr>
             <a:r>
-              <a:rPr lang="pt-BR" dirty="0">
+              <a:rPr lang="pt-BR" sz="1200" dirty="0">
                 <a:solidFill>
                   <a:srgbClr val="FF0000"/>
                 </a:solidFill>
@@ -6786,7 +6931,7 @@
               <a:t>Quando o usuário clicar em “</a:t>
             </a:r>
             <a:r>
-              <a:rPr lang="pt-BR" b="1" dirty="0">
+              <a:rPr lang="pt-BR" sz="1200" b="1" dirty="0">
                 <a:solidFill>
                   <a:srgbClr val="FF0000"/>
                 </a:solidFill>
@@ -6794,7 +6939,7 @@
               <a:t>CRIAR</a:t>
             </a:r>
             <a:r>
-              <a:rPr lang="pt-BR" dirty="0">
+              <a:rPr lang="pt-BR" sz="1200" dirty="0">
                 <a:solidFill>
                   <a:srgbClr val="FF0000"/>
                 </a:solidFill>
@@ -6802,7 +6947,7 @@
               <a:t>” deverá executar o script do Jenkins com as mesma variáveis de hoje, porém deverá ser incluída uma nova variável com o modelo do banco de dados que deve ser o valor </a:t>
             </a:r>
             <a:r>
-              <a:rPr lang="pt-BR" dirty="0" err="1">
+              <a:rPr lang="pt-BR" sz="1200" dirty="0" err="1">
                 <a:solidFill>
                   <a:srgbClr val="FF0000"/>
                 </a:solidFill>
@@ -6810,26 +6955,46 @@
               <a:t>string</a:t>
             </a:r>
             <a:r>
-              <a:rPr lang="pt-BR" dirty="0">
-                <a:solidFill>
-                  <a:srgbClr val="FF0000"/>
-                </a:solidFill>
-              </a:rPr>
-              <a:t> do campo do cadastro da imagem.</a:t>
-            </a:r>
-          </a:p>
-          <a:p>
-            <a:endParaRPr lang="pt-BR" dirty="0">
+              <a:rPr lang="pt-BR" sz="1200" dirty="0">
+                <a:solidFill>
+                  <a:srgbClr val="FF0000"/>
+                </a:solidFill>
+              </a:rPr>
+              <a:t> do campo do cadastro da imagem. </a:t>
+            </a:r>
+            <a:br>
+              <a:rPr lang="pt-BR" sz="1200" dirty="0">
+                <a:solidFill>
+                  <a:srgbClr val="FF0000"/>
+                </a:solidFill>
+              </a:rPr>
+            </a:br>
+            <a:r>
+              <a:rPr lang="pt-BR" sz="1200" dirty="0" smtClean="0">
+                <a:solidFill>
+                  <a:srgbClr val="00B050"/>
+                </a:solidFill>
+              </a:rPr>
+              <a:t>OK</a:t>
+            </a:r>
+            <a:endParaRPr lang="pt-BR" sz="1200" dirty="0">
               <a:solidFill>
                 <a:srgbClr val="FF0000"/>
               </a:solidFill>
             </a:endParaRPr>
           </a:p>
           <a:p>
+            <a:endParaRPr lang="pt-BR" sz="1200" dirty="0">
+              <a:solidFill>
+                <a:srgbClr val="FF0000"/>
+              </a:solidFill>
+            </a:endParaRPr>
+          </a:p>
+          <a:p>
             <a:pPr marL="342900" indent="-342900">
               <a:buAutoNum type="arabicParenR"/>
             </a:pPr>
-            <a:endParaRPr lang="pt-BR" dirty="0">
+            <a:endParaRPr lang="pt-BR" sz="1200" dirty="0">
               <a:solidFill>
                 <a:srgbClr val="FF0000"/>
               </a:solidFill>
@@ -7271,6 +7436,122 @@
           </a:p>
         </p:txBody>
       </p:sp>
+      <p:sp>
+        <p:nvSpPr>
+          <p:cNvPr id="28" name="CaixaDeTexto 27">
+            <a:extLst>
+              <a:ext uri="{FF2B5EF4-FFF2-40B4-BE49-F238E27FC236}">
+                <a16:creationId xmlns:a16="http://schemas.microsoft.com/office/drawing/2014/main" id="{D7CE3CBF-66CB-45CF-9138-3B8A991007FC}"/>
+              </a:ext>
+            </a:extLst>
+          </p:cNvPr>
+          <p:cNvSpPr txBox="1"/>
+          <p:nvPr/>
+        </p:nvSpPr>
+        <p:spPr>
+          <a:xfrm>
+            <a:off x="5990739" y="4845614"/>
+            <a:ext cx="5889322" cy="1446550"/>
+          </a:xfrm>
+          <a:prstGeom prst="rect">
+            <a:avLst/>
+          </a:prstGeom>
+          <a:noFill/>
+          <a:ln w="22225">
+            <a:solidFill>
+              <a:srgbClr val="FF0000"/>
+            </a:solidFill>
+          </a:ln>
+        </p:spPr>
+        <p:txBody>
+          <a:bodyPr wrap="square" rtlCol="0">
+            <a:spAutoFit/>
+          </a:bodyPr>
+          <a:lstStyle/>
+          <a:p>
+            <a:r>
+              <a:rPr lang="pt-BR" sz="1100" b="1" dirty="0" smtClean="0">
+                <a:solidFill>
+                  <a:srgbClr val="00B0F0"/>
+                </a:solidFill>
+              </a:rPr>
+              <a:t>====ARQUIVOS ALTERADOS====</a:t>
+            </a:r>
+          </a:p>
+          <a:p>
+            <a:r>
+              <a:rPr lang="pt-BR" sz="1100" b="1" dirty="0">
+                <a:solidFill>
+                  <a:srgbClr val="00B0F0"/>
+                </a:solidFill>
+              </a:rPr>
+              <a:t>API</a:t>
+            </a:r>
+          </a:p>
+          <a:p>
+            <a:r>
+              <a:rPr lang="pt-BR" sz="1100" b="1" dirty="0">
+                <a:solidFill>
+                  <a:srgbClr val="00B0F0"/>
+                </a:solidFill>
+              </a:rPr>
+              <a:t>deployment.py</a:t>
+            </a:r>
+          </a:p>
+          <a:p>
+            <a:endParaRPr lang="pt-BR" sz="1100" b="1" u="sng" dirty="0">
+              <a:solidFill>
+                <a:srgbClr val="00B0F0"/>
+              </a:solidFill>
+            </a:endParaRPr>
+          </a:p>
+          <a:p>
+            <a:r>
+              <a:rPr lang="pt-BR" sz="1100" b="1" dirty="0" smtClean="0">
+                <a:solidFill>
+                  <a:srgbClr val="00B0F0"/>
+                </a:solidFill>
+              </a:rPr>
+              <a:t>WEB</a:t>
+            </a:r>
+          </a:p>
+          <a:p>
+            <a:r>
+              <a:rPr lang="pt-BR" sz="1100" b="1" dirty="0">
+                <a:solidFill>
+                  <a:srgbClr val="00B0F0"/>
+                </a:solidFill>
+              </a:rPr>
+              <a:t>forms.py</a:t>
+            </a:r>
+          </a:p>
+          <a:p>
+            <a:r>
+              <a:rPr lang="pt-BR" sz="1100" b="1" dirty="0">
+                <a:solidFill>
+                  <a:srgbClr val="00B0F0"/>
+                </a:solidFill>
+              </a:rPr>
+              <a:t>modal-create.html</a:t>
+            </a:r>
+          </a:p>
+          <a:p>
+            <a:r>
+              <a:rPr lang="pt-BR" sz="1100" b="1" dirty="0">
+                <a:solidFill>
+                  <a:srgbClr val="00B0F0"/>
+                </a:solidFill>
+              </a:rPr>
+              <a:t>list_containers.js</a:t>
+            </a:r>
+            <a:endParaRPr lang="pt-BR" sz="1100" dirty="0">
+              <a:solidFill>
+                <a:srgbClr val="00B0F0"/>
+              </a:solidFill>
+            </a:endParaRPr>
+          </a:p>
+        </p:txBody>
+      </p:sp>
     </p:spTree>
     <p:extLst>
       <p:ext uri="{BB962C8B-B14F-4D97-AF65-F5344CB8AC3E}">
@@ -8006,8 +8287,8 @@
         </p:nvSpPr>
         <p:spPr>
           <a:xfrm>
-            <a:off x="5974974" y="148803"/>
-            <a:ext cx="5892835" cy="3693319"/>
+            <a:off x="5974974" y="189993"/>
+            <a:ext cx="5892835" cy="3323987"/>
           </a:xfrm>
           <a:prstGeom prst="rect">
             <a:avLst/>
@@ -8026,7 +8307,7 @@
           <a:lstStyle/>
           <a:p>
             <a:r>
-              <a:rPr lang="pt-BR" b="1" dirty="0">
+              <a:rPr lang="pt-BR" sz="1400" b="1" dirty="0">
                 <a:solidFill>
                   <a:srgbClr val="FF0000"/>
                 </a:solidFill>
@@ -8035,7 +8316,7 @@
             </a:r>
           </a:p>
           <a:p>
-            <a:endParaRPr lang="pt-BR" dirty="0">
+            <a:endParaRPr lang="pt-BR" sz="1400" dirty="0">
               <a:solidFill>
                 <a:srgbClr val="FF0000"/>
               </a:solidFill>
@@ -8046,7 +8327,7 @@
               <a:buAutoNum type="arabicParenR"/>
             </a:pPr>
             <a:r>
-              <a:rPr lang="pt-BR" dirty="0">
+              <a:rPr lang="pt-BR" sz="1400" dirty="0">
                 <a:solidFill>
                   <a:srgbClr val="FF0000"/>
                 </a:solidFill>
@@ -8054,7 +8335,7 @@
               <a:t>Incluir a funcionalidade de “</a:t>
             </a:r>
             <a:r>
-              <a:rPr lang="pt-BR" b="1" dirty="0">
+              <a:rPr lang="pt-BR" sz="1400" b="1" dirty="0">
                 <a:solidFill>
                   <a:srgbClr val="FF0000"/>
                 </a:solidFill>
@@ -8062,20 +8343,56 @@
               <a:t>Atualizar Imagens”</a:t>
             </a:r>
             <a:r>
-              <a:rPr lang="pt-BR" dirty="0">
-                <a:solidFill>
-                  <a:srgbClr val="FF0000"/>
-                </a:solidFill>
-              </a:rPr>
-              <a:t> no grid de Instâncias</a:t>
-            </a:r>
+              <a:rPr lang="pt-BR" sz="1400" dirty="0">
+                <a:solidFill>
+                  <a:srgbClr val="FF0000"/>
+                </a:solidFill>
+              </a:rPr>
+              <a:t> no grid de </a:t>
+            </a:r>
+            <a:r>
+              <a:rPr lang="pt-BR" sz="1400" dirty="0" smtClean="0">
+                <a:solidFill>
+                  <a:srgbClr val="FF0000"/>
+                </a:solidFill>
+              </a:rPr>
+              <a:t>Instâncias</a:t>
+            </a:r>
+            <a:br>
+              <a:rPr lang="pt-BR" sz="1400" dirty="0" smtClean="0">
+                <a:solidFill>
+                  <a:srgbClr val="FF0000"/>
+                </a:solidFill>
+              </a:rPr>
+            </a:br>
+            <a:r>
+              <a:rPr lang="pt-BR" sz="1400" dirty="0" smtClean="0">
+                <a:solidFill>
+                  <a:srgbClr val="00B050"/>
+                </a:solidFill>
+              </a:rPr>
+              <a:t>OK</a:t>
+            </a:r>
+            <a:r>
+              <a:rPr lang="pt-BR" sz="1400" dirty="0" smtClean="0">
+                <a:solidFill>
+                  <a:srgbClr val="FF0000"/>
+                </a:solidFill>
+              </a:rPr>
+              <a:t>	</a:t>
+            </a:r>
+            <a:endParaRPr lang="pt-BR" sz="1400" dirty="0">
+              <a:solidFill>
+                <a:srgbClr val="FF0000"/>
+              </a:solidFill>
+            </a:endParaRPr>
           </a:p>
           <a:p>
             <a:pPr marL="342900" indent="-342900">
               <a:buAutoNum type="arabicParenR"/>
             </a:pPr>
             <a:r>
-              <a:rPr lang="pt-BR" dirty="0">
+              <a:rPr lang="pt-BR" sz="1400" dirty="0">
                 <a:solidFill>
                   <a:srgbClr val="FF0000"/>
                 </a:solidFill>
@@ -8083,7 +8400,7 @@
               <a:t>Quando clicar no botão      , abrir a tela ao lado e após o usuários inserir os dados da imagem, ao clicar no botão “</a:t>
             </a:r>
             <a:r>
-              <a:rPr lang="pt-BR" b="1" dirty="0">
+              <a:rPr lang="pt-BR" sz="1400" b="1" dirty="0">
                 <a:solidFill>
                   <a:srgbClr val="FF0000"/>
                 </a:solidFill>
@@ -8091,7 +8408,7 @@
               <a:t>Atualizar</a:t>
             </a:r>
             <a:r>
-              <a:rPr lang="pt-BR" dirty="0">
+              <a:rPr lang="pt-BR" sz="1400" dirty="0">
                 <a:solidFill>
                   <a:srgbClr val="FF0000"/>
                 </a:solidFill>
@@ -8099,7 +8416,7 @@
               <a:t>”, executar o build do Jenkins “</a:t>
             </a:r>
             <a:r>
-              <a:rPr lang="pt-BR" b="1" dirty="0" err="1">
+              <a:rPr lang="pt-BR" sz="1400" b="1" dirty="0" err="1">
                 <a:solidFill>
                   <a:srgbClr val="FF0000"/>
                 </a:solidFill>
@@ -8107,20 +8424,40 @@
               <a:t>Upgrade_Odoo</a:t>
             </a:r>
             <a:r>
-              <a:rPr lang="pt-BR" dirty="0">
+              <a:rPr lang="pt-BR" sz="1400" dirty="0" smtClean="0">
                 <a:solidFill>
                   <a:srgbClr val="FF0000"/>
                 </a:solidFill>
               </a:rPr>
               <a:t>”</a:t>
             </a:r>
+            <a:br>
+              <a:rPr lang="pt-BR" sz="1400" dirty="0" smtClean="0">
+                <a:solidFill>
+                  <a:srgbClr val="FF0000"/>
+                </a:solidFill>
+              </a:rPr>
+            </a:br>
+            <a:r>
+              <a:rPr lang="pt-BR" sz="1400" dirty="0">
+                <a:solidFill>
+                  <a:srgbClr val="00B050"/>
+                </a:solidFill>
+              </a:rPr>
+              <a:t>OK</a:t>
+            </a:r>
+            <a:endParaRPr lang="pt-BR" sz="1400" dirty="0">
+              <a:solidFill>
+                <a:srgbClr val="FF0000"/>
+              </a:solidFill>
+            </a:endParaRPr>
           </a:p>
           <a:p>
             <a:pPr marL="342900" indent="-342900">
               <a:buAutoNum type="arabicParenR"/>
             </a:pPr>
             <a:r>
-              <a:rPr lang="pt-BR" dirty="0">
+              <a:rPr lang="pt-BR" sz="1400" dirty="0">
                 <a:solidFill>
                   <a:srgbClr val="FF0000"/>
                 </a:solidFill>
@@ -8134,7 +8471,7 @@
               <a:buChar char="§"/>
             </a:pPr>
             <a:r>
-              <a:rPr lang="pt-BR" dirty="0">
+              <a:rPr lang="pt-BR" sz="1400" dirty="0">
                 <a:solidFill>
                   <a:srgbClr val="FF0000"/>
                 </a:solidFill>
@@ -8148,7 +8485,7 @@
               <a:buChar char="§"/>
             </a:pPr>
             <a:r>
-              <a:rPr lang="pt-BR" dirty="0">
+              <a:rPr lang="pt-BR" sz="1400" dirty="0">
                 <a:solidFill>
                   <a:srgbClr val="FF0000"/>
                 </a:solidFill>
@@ -8162,7 +8499,7 @@
               <a:buChar char="§"/>
             </a:pPr>
             <a:r>
-              <a:rPr lang="pt-BR" dirty="0">
+              <a:rPr lang="pt-BR" sz="1400" dirty="0">
                 <a:solidFill>
                   <a:srgbClr val="FF0000"/>
                 </a:solidFill>
@@ -8176,7 +8513,7 @@
               <a:buChar char="§"/>
             </a:pPr>
             <a:r>
-              <a:rPr lang="pt-BR" dirty="0">
+              <a:rPr lang="pt-BR" sz="1400" dirty="0">
                 <a:solidFill>
                   <a:srgbClr val="FF0000"/>
                 </a:solidFill>
@@ -8190,13 +8527,37 @@
               <a:buChar char="§"/>
             </a:pPr>
             <a:r>
-              <a:rPr lang="pt-BR" dirty="0">
-                <a:solidFill>
-                  <a:srgbClr val="FF0000"/>
-                </a:solidFill>
-              </a:rPr>
-              <a:t>Modelo de Banco de Dados</a:t>
-            </a:r>
+              <a:rPr lang="pt-BR" sz="1400" dirty="0">
+                <a:solidFill>
+                  <a:srgbClr val="FF0000"/>
+                </a:solidFill>
+              </a:rPr>
+              <a:t>Modelo de Banco de </a:t>
+            </a:r>
+            <a:r>
+              <a:rPr lang="pt-BR" sz="1400" dirty="0" smtClean="0">
+                <a:solidFill>
+                  <a:srgbClr val="FF0000"/>
+                </a:solidFill>
+              </a:rPr>
+              <a:t>Dados</a:t>
+            </a:r>
+          </a:p>
+          <a:p>
+            <a:pPr lvl="1"/>
+            <a:r>
+              <a:rPr lang="pt-BR" sz="1400" dirty="0" smtClean="0">
+                <a:solidFill>
+                  <a:srgbClr val="00B050"/>
+                </a:solidFill>
+              </a:rPr>
+              <a:t>OK</a:t>
+            </a:r>
+            <a:endParaRPr lang="pt-BR" sz="1400" dirty="0">
+              <a:solidFill>
+                <a:srgbClr val="FF0000"/>
+              </a:solidFill>
+            </a:endParaRPr>
           </a:p>
         </p:txBody>
       </p:sp>
@@ -8656,7 +9017,7 @@
         </p:blipFill>
         <p:spPr>
           <a:xfrm>
-            <a:off x="8616591" y="1251364"/>
+            <a:off x="8616591" y="1537386"/>
             <a:ext cx="304800" cy="304800"/>
           </a:xfrm>
           <a:prstGeom prst="rect">
@@ -8664,6 +9025,122 @@
           </a:prstGeom>
         </p:spPr>
       </p:pic>
+      <p:sp>
+        <p:nvSpPr>
+          <p:cNvPr id="29" name="CaixaDeTexto 28">
+            <a:extLst>
+              <a:ext uri="{FF2B5EF4-FFF2-40B4-BE49-F238E27FC236}">
+                <a16:creationId xmlns:a16="http://schemas.microsoft.com/office/drawing/2014/main" id="{D7CE3CBF-66CB-45CF-9138-3B8A991007FC}"/>
+              </a:ext>
+            </a:extLst>
+          </p:cNvPr>
+          <p:cNvSpPr txBox="1"/>
+          <p:nvPr/>
+        </p:nvSpPr>
+        <p:spPr>
+          <a:xfrm>
+            <a:off x="5974974" y="3681364"/>
+            <a:ext cx="5889322" cy="1446550"/>
+          </a:xfrm>
+          <a:prstGeom prst="rect">
+            <a:avLst/>
+          </a:prstGeom>
+          <a:noFill/>
+          <a:ln w="22225">
+            <a:solidFill>
+              <a:srgbClr val="FF0000"/>
+            </a:solidFill>
+          </a:ln>
+        </p:spPr>
+        <p:txBody>
+          <a:bodyPr wrap="square" rtlCol="0">
+            <a:spAutoFit/>
+          </a:bodyPr>
+          <a:lstStyle/>
+          <a:p>
+            <a:r>
+              <a:rPr lang="pt-BR" sz="1100" b="1" dirty="0" smtClean="0">
+                <a:solidFill>
+                  <a:srgbClr val="00B0F0"/>
+                </a:solidFill>
+              </a:rPr>
+              <a:t>====ARQUIVOS ALTERADOS====</a:t>
+            </a:r>
+          </a:p>
+          <a:p>
+            <a:r>
+              <a:rPr lang="pt-BR" sz="1100" b="1" dirty="0">
+                <a:solidFill>
+                  <a:srgbClr val="00B0F0"/>
+                </a:solidFill>
+              </a:rPr>
+              <a:t>API</a:t>
+            </a:r>
+          </a:p>
+          <a:p>
+            <a:r>
+              <a:rPr lang="pt-BR" sz="1100" b="1" dirty="0">
+                <a:solidFill>
+                  <a:srgbClr val="00B0F0"/>
+                </a:solidFill>
+              </a:rPr>
+              <a:t>deployment.py</a:t>
+            </a:r>
+          </a:p>
+          <a:p>
+            <a:endParaRPr lang="pt-BR" sz="1100" b="1" dirty="0">
+              <a:solidFill>
+                <a:srgbClr val="00B0F0"/>
+              </a:solidFill>
+            </a:endParaRPr>
+          </a:p>
+          <a:p>
+            <a:r>
+              <a:rPr lang="pt-BR" sz="1100" b="1" dirty="0">
+                <a:solidFill>
+                  <a:srgbClr val="00B0F0"/>
+                </a:solidFill>
+              </a:rPr>
+              <a:t>WEB</a:t>
+            </a:r>
+          </a:p>
+          <a:p>
+            <a:r>
+              <a:rPr lang="pt-BR" sz="1100" b="1" dirty="0">
+                <a:solidFill>
+                  <a:srgbClr val="00B0F0"/>
+                </a:solidFill>
+              </a:rPr>
+              <a:t>deployments.html</a:t>
+            </a:r>
+          </a:p>
+          <a:p>
+            <a:r>
+              <a:rPr lang="pt-BR" sz="1100" b="1" dirty="0">
+                <a:solidFill>
+                  <a:srgbClr val="00B0F0"/>
+                </a:solidFill>
+              </a:rPr>
+              <a:t>modal-update.html</a:t>
+            </a:r>
+          </a:p>
+          <a:p>
+            <a:r>
+              <a:rPr lang="pt-BR" sz="1100" b="1" dirty="0">
+                <a:solidFill>
+                  <a:srgbClr val="00B0F0"/>
+                </a:solidFill>
+              </a:rPr>
+              <a:t>list_containers.js</a:t>
+            </a:r>
+            <a:endParaRPr lang="pt-BR" sz="1100" dirty="0">
+              <a:solidFill>
+                <a:srgbClr val="00B0F0"/>
+              </a:solidFill>
+            </a:endParaRPr>
+          </a:p>
+        </p:txBody>
+      </p:sp>
     </p:spTree>
     <p:extLst>
       <p:ext uri="{BB962C8B-B14F-4D97-AF65-F5344CB8AC3E}">
@@ -8769,7 +9246,7 @@
         <p:spPr>
           <a:xfrm>
             <a:off x="424067" y="3288097"/>
-            <a:ext cx="5671933" cy="3200876"/>
+            <a:ext cx="5671933" cy="3323987"/>
           </a:xfrm>
           <a:prstGeom prst="rect">
             <a:avLst/>
@@ -8784,7 +9261,7 @@
           <a:p>
             <a:pPr algn="just"/>
             <a:r>
-              <a:rPr lang="pt-BR" sz="2000" b="1" dirty="0">
+              <a:rPr lang="pt-BR" sz="1200" b="1" dirty="0">
                 <a:solidFill>
                   <a:srgbClr val="FF0000"/>
                 </a:solidFill>
@@ -8794,118 +9271,229 @@
           </a:p>
           <a:p>
             <a:pPr algn="just"/>
-            <a:endParaRPr lang="pt-BR" sz="2000" b="1" dirty="0">
+            <a:endParaRPr lang="pt-BR" sz="1200" b="1" dirty="0">
               <a:solidFill>
                 <a:srgbClr val="FF0000"/>
               </a:solidFill>
             </a:endParaRPr>
           </a:p>
           <a:p>
+            <a:pPr marL="457200" indent="-457200">
+              <a:buAutoNum type="arabicParenR"/>
+            </a:pPr>
+            <a:r>
+              <a:rPr lang="pt-BR" sz="1200" dirty="0">
+                <a:solidFill>
+                  <a:srgbClr val="FF0000"/>
+                </a:solidFill>
+              </a:rPr>
+              <a:t>Coluna </a:t>
+            </a:r>
+            <a:r>
+              <a:rPr lang="pt-BR" sz="1200" b="1" dirty="0">
+                <a:solidFill>
+                  <a:srgbClr val="FF0000"/>
+                </a:solidFill>
+              </a:rPr>
+              <a:t>CNPJ</a:t>
+            </a:r>
+            <a:r>
+              <a:rPr lang="pt-BR" sz="1200" dirty="0">
+                <a:solidFill>
+                  <a:srgbClr val="FF0000"/>
+                </a:solidFill>
+              </a:rPr>
+              <a:t> deverá apresentar o valor do novo campo da criação da </a:t>
+            </a:r>
+            <a:r>
+              <a:rPr lang="pt-BR" sz="1200" dirty="0" smtClean="0">
+                <a:solidFill>
+                  <a:srgbClr val="FF0000"/>
+                </a:solidFill>
+              </a:rPr>
+              <a:t>instância (vide slide 2)</a:t>
+            </a:r>
+            <a:br>
+              <a:rPr lang="pt-BR" sz="1200" dirty="0" smtClean="0">
+                <a:solidFill>
+                  <a:srgbClr val="FF0000"/>
+                </a:solidFill>
+              </a:rPr>
+            </a:br>
+            <a:r>
+              <a:rPr lang="pt-BR" sz="1200" dirty="0" smtClean="0">
+                <a:solidFill>
+                  <a:srgbClr val="00B050"/>
+                </a:solidFill>
+              </a:rPr>
+              <a:t>OK</a:t>
+            </a:r>
+            <a:br>
+              <a:rPr lang="pt-BR" sz="1200" dirty="0" smtClean="0">
+                <a:solidFill>
+                  <a:srgbClr val="00B050"/>
+                </a:solidFill>
+              </a:rPr>
+            </a:br>
+            <a:endParaRPr lang="pt-BR" sz="1200" dirty="0">
+              <a:solidFill>
+                <a:srgbClr val="00B050"/>
+              </a:solidFill>
+            </a:endParaRPr>
+          </a:p>
+          <a:p>
+            <a:pPr marL="457200" indent="-457200">
+              <a:buFontTx/>
+              <a:buAutoNum type="arabicParenR"/>
+            </a:pPr>
+            <a:r>
+              <a:rPr lang="pt-BR" sz="1200" dirty="0">
+                <a:solidFill>
+                  <a:srgbClr val="FF0000"/>
+                </a:solidFill>
+              </a:rPr>
+              <a:t>Acrescentar uma nova coluna com o nome “</a:t>
+            </a:r>
+            <a:r>
+              <a:rPr lang="pt-BR" sz="1200" b="1" dirty="0">
+                <a:solidFill>
+                  <a:srgbClr val="FF0000"/>
+                </a:solidFill>
+              </a:rPr>
+              <a:t>Nome ou Razão Social</a:t>
+            </a:r>
+            <a:r>
+              <a:rPr lang="pt-BR" sz="1200" dirty="0">
+                <a:solidFill>
+                  <a:srgbClr val="FF0000"/>
+                </a:solidFill>
+              </a:rPr>
+              <a:t>” novo campo da criação da instância (vide slide 2) </a:t>
+            </a:r>
+            <a:br>
+              <a:rPr lang="pt-BR" sz="1200" dirty="0">
+                <a:solidFill>
+                  <a:srgbClr val="FF0000"/>
+                </a:solidFill>
+              </a:rPr>
+            </a:br>
+            <a:r>
+              <a:rPr lang="pt-BR" sz="1200" dirty="0">
+                <a:solidFill>
+                  <a:srgbClr val="00B050"/>
+                </a:solidFill>
+              </a:rPr>
+              <a:t>OK</a:t>
+            </a:r>
+          </a:p>
+          <a:p>
             <a:pPr marL="457200" indent="-457200" algn="just">
               <a:buAutoNum type="arabicParenR"/>
             </a:pPr>
-            <a:r>
-              <a:rPr lang="pt-BR" dirty="0">
-                <a:solidFill>
-                  <a:srgbClr val="FF0000"/>
-                </a:solidFill>
-              </a:rPr>
-              <a:t>Coluna </a:t>
-            </a:r>
-            <a:r>
-              <a:rPr lang="pt-BR" b="1" dirty="0">
-                <a:solidFill>
-                  <a:srgbClr val="FF0000"/>
-                </a:solidFill>
-              </a:rPr>
-              <a:t>CNPJ</a:t>
-            </a:r>
-            <a:r>
-              <a:rPr lang="pt-BR" dirty="0">
-                <a:solidFill>
-                  <a:srgbClr val="FF0000"/>
-                </a:solidFill>
-              </a:rPr>
-              <a:t> deverá apresentar o valor do novo campo da criação da instância (vide slide 2)</a:t>
-            </a:r>
-          </a:p>
-          <a:p>
-            <a:pPr marL="457200" indent="-457200" algn="just">
+            <a:endParaRPr lang="pt-BR" sz="1200" dirty="0">
+              <a:solidFill>
+                <a:srgbClr val="FF0000"/>
+              </a:solidFill>
+            </a:endParaRPr>
+          </a:p>
+          <a:p>
+            <a:pPr marL="457200" indent="-457200">
+              <a:buFontTx/>
               <a:buAutoNum type="arabicParenR"/>
             </a:pPr>
             <a:r>
-              <a:rPr lang="pt-BR" dirty="0">
-                <a:solidFill>
-                  <a:srgbClr val="FF0000"/>
-                </a:solidFill>
-              </a:rPr>
-              <a:t>Acrescentar uma nova coluna com o nome “</a:t>
-            </a:r>
-            <a:r>
-              <a:rPr lang="pt-BR" b="1" dirty="0">
-                <a:solidFill>
-                  <a:srgbClr val="FF0000"/>
-                </a:solidFill>
-              </a:rPr>
-              <a:t>Nome ou Razão Social</a:t>
-            </a:r>
-            <a:r>
-              <a:rPr lang="pt-BR" dirty="0">
-                <a:solidFill>
-                  <a:srgbClr val="FF0000"/>
-                </a:solidFill>
-              </a:rPr>
-              <a:t>” novo campo da criação da instância (vide slide 2)</a:t>
-            </a:r>
-          </a:p>
-          <a:p>
-            <a:pPr marL="457200" indent="-457200" algn="just">
+              <a:rPr lang="pt-BR" sz="1200" dirty="0" smtClean="0">
+                <a:solidFill>
+                  <a:srgbClr val="FF0000"/>
+                </a:solidFill>
+              </a:rPr>
+              <a:t>Alterar a função do botão “</a:t>
+            </a:r>
+            <a:r>
+              <a:rPr lang="pt-BR" sz="1200" b="1" dirty="0" smtClean="0">
+                <a:solidFill>
+                  <a:srgbClr val="FF0000"/>
+                </a:solidFill>
+              </a:rPr>
+              <a:t>Visualizar Log</a:t>
+            </a:r>
+            <a:r>
+              <a:rPr lang="pt-BR" sz="1200" dirty="0" smtClean="0">
+                <a:solidFill>
+                  <a:srgbClr val="FF0000"/>
+                </a:solidFill>
+              </a:rPr>
+              <a:t>”. A função que deverá ser a mesma que o botão da tela </a:t>
+            </a:r>
+            <a:r>
+              <a:rPr lang="pt-BR" sz="1200" dirty="0" smtClean="0">
+                <a:hlinkClick r:id="rId3"/>
+              </a:rPr>
+              <a:t>http://18.219.63.233:8000/pods</a:t>
+            </a:r>
+            <a:r>
+              <a:rPr lang="pt-BR" sz="1200" dirty="0" smtClean="0">
+                <a:solidFill>
+                  <a:srgbClr val="FF0000"/>
+                </a:solidFill>
+              </a:rPr>
+              <a:t>, porém com algumas alterações conforme </a:t>
+            </a:r>
+            <a:r>
+              <a:rPr lang="pt-BR" sz="1200" dirty="0">
+                <a:solidFill>
+                  <a:srgbClr val="FF0000"/>
+                </a:solidFill>
+              </a:rPr>
+              <a:t>ao lado</a:t>
+            </a:r>
+            <a:br>
+              <a:rPr lang="pt-BR" sz="1200" dirty="0">
+                <a:solidFill>
+                  <a:srgbClr val="FF0000"/>
+                </a:solidFill>
+              </a:rPr>
+            </a:br>
+            <a:r>
+              <a:rPr lang="pt-BR" sz="1200" dirty="0">
+                <a:solidFill>
+                  <a:srgbClr val="00B050"/>
+                </a:solidFill>
+              </a:rPr>
+              <a:t>OK</a:t>
+            </a:r>
+          </a:p>
+          <a:p>
+            <a:r>
+              <a:rPr lang="pt-BR" sz="1400" dirty="0">
+                <a:solidFill>
+                  <a:srgbClr val="FF0000"/>
+                </a:solidFill>
+              </a:rPr>
+              <a:t/>
+            </a:r>
+            <a:br>
+              <a:rPr lang="pt-BR" sz="1400" dirty="0">
+                <a:solidFill>
+                  <a:srgbClr val="FF0000"/>
+                </a:solidFill>
+              </a:rPr>
+            </a:br>
+            <a:endParaRPr lang="pt-BR" sz="1400" dirty="0">
+              <a:solidFill>
+                <a:srgbClr val="00B050"/>
+              </a:solidFill>
+            </a:endParaRPr>
+          </a:p>
+          <a:p>
+            <a:pPr marL="457200" indent="-457200">
               <a:buAutoNum type="arabicParenR"/>
             </a:pPr>
-            <a:r>
-              <a:rPr lang="pt-BR" dirty="0">
-                <a:solidFill>
-                  <a:srgbClr val="FF0000"/>
-                </a:solidFill>
-              </a:rPr>
-              <a:t>Alterar a função do botão “</a:t>
-            </a:r>
-            <a:r>
-              <a:rPr lang="pt-BR" b="1" dirty="0">
-                <a:solidFill>
-                  <a:srgbClr val="FF0000"/>
-                </a:solidFill>
-              </a:rPr>
-              <a:t>Visualizar Log</a:t>
-            </a:r>
-            <a:r>
-              <a:rPr lang="pt-BR" dirty="0">
-                <a:solidFill>
-                  <a:srgbClr val="FF0000"/>
-                </a:solidFill>
-              </a:rPr>
-              <a:t>”. A função que deverá ser a mesma que o botão da tela </a:t>
-            </a:r>
-            <a:r>
-              <a:rPr lang="pt-BR" dirty="0">
-                <a:hlinkClick r:id="rId3"/>
-              </a:rPr>
-              <a:t>http://18.219.63.233:8000/</a:t>
-            </a:r>
-            <a:r>
-              <a:rPr lang="pt-BR" dirty="0" err="1">
-                <a:hlinkClick r:id="rId3"/>
-              </a:rPr>
-              <a:t>pods</a:t>
-            </a:r>
-            <a:r>
-              <a:rPr lang="pt-BR" dirty="0">
-                <a:solidFill>
-                  <a:srgbClr val="FF0000"/>
-                </a:solidFill>
-              </a:rPr>
-              <a:t>, porém com algumas alterações conforme ao lado</a:t>
-            </a:r>
+            <a:endParaRPr lang="pt-BR" sz="1400" dirty="0">
+              <a:solidFill>
+                <a:srgbClr val="FF0000"/>
+              </a:solidFill>
+            </a:endParaRPr>
           </a:p>
         </p:txBody>
       </p:sp>
@@ -8998,8 +9586,8 @@
         </p:nvSpPr>
         <p:spPr>
           <a:xfrm>
-            <a:off x="6187904" y="3288097"/>
-            <a:ext cx="5671933" cy="3200876"/>
+            <a:off x="6195878" y="3132111"/>
+            <a:ext cx="5671933" cy="2739211"/>
           </a:xfrm>
           <a:prstGeom prst="rect">
             <a:avLst/>
@@ -9014,7 +9602,7 @@
           <a:p>
             <a:pPr algn="just"/>
             <a:r>
-              <a:rPr lang="pt-BR" sz="2000" b="1" dirty="0">
+              <a:rPr lang="pt-BR" sz="1400" b="1" dirty="0" smtClean="0">
                 <a:solidFill>
                   <a:srgbClr val="FF0000"/>
                 </a:solidFill>
@@ -9024,16 +9612,15 @@
           </a:p>
           <a:p>
             <a:pPr algn="just"/>
-            <a:endParaRPr lang="pt-BR" sz="2000" b="1" dirty="0">
+            <a:endParaRPr lang="pt-BR" sz="1400" b="1" dirty="0" smtClean="0">
               <a:solidFill>
                 <a:srgbClr val="FF0000"/>
               </a:solidFill>
             </a:endParaRPr>
           </a:p>
           <a:p>
-            <a:pPr algn="just"/>
-            <a:r>
-              <a:rPr lang="pt-BR" dirty="0">
+            <a:r>
+              <a:rPr lang="pt-BR" sz="1400" dirty="0" smtClean="0">
                 <a:solidFill>
                   <a:srgbClr val="FF0000"/>
                 </a:solidFill>
@@ -9042,9 +9629,8 @@
             </a:r>
           </a:p>
           <a:p>
-            <a:pPr algn="just"/>
-            <a:r>
-              <a:rPr lang="pt-BR" dirty="0">
+            <a:r>
+              <a:rPr lang="pt-BR" sz="1400" dirty="0" smtClean="0">
                 <a:solidFill>
                   <a:srgbClr val="FF0000"/>
                 </a:solidFill>
@@ -9052,14 +9638,13 @@
               <a:t>Nome da Instância: </a:t>
             </a:r>
             <a:r>
-              <a:rPr lang="pt-BR" dirty="0"/>
+              <a:rPr lang="pt-BR" sz="1400" dirty="0" smtClean="0"/>
               <a:t>bradooteste2</a:t>
             </a:r>
           </a:p>
           <a:p>
-            <a:pPr algn="just"/>
-            <a:r>
-              <a:rPr lang="pt-BR" dirty="0">
+            <a:r>
+              <a:rPr lang="pt-BR" sz="1400" dirty="0" smtClean="0">
                 <a:solidFill>
                   <a:srgbClr val="FF0000"/>
                 </a:solidFill>
@@ -9067,20 +9652,137 @@
               <a:t>Nome do Container: </a:t>
             </a:r>
             <a:r>
-              <a:rPr lang="pt-BR" dirty="0"/>
+              <a:rPr lang="pt-BR" sz="1400" dirty="0" smtClean="0"/>
               <a:t>bradooteste2-84fb8bbc54-mjt25</a:t>
             </a:r>
           </a:p>
           <a:p>
-            <a:pPr algn="just"/>
-            <a:r>
-              <a:rPr lang="pt-BR" dirty="0">
+            <a:r>
+              <a:rPr lang="pt-BR" sz="1400" dirty="0" smtClean="0">
                 <a:solidFill>
                   <a:srgbClr val="FF0000"/>
                 </a:solidFill>
               </a:rPr>
               <a:t>Antes de chamar a função do log, deverá ser executada a API para obter o nome do container que utiliza como chave o nome da instância e assim poder executar a função do log passando como parâmetro o nome do container.</a:t>
             </a:r>
+            <a:br>
+              <a:rPr lang="pt-BR" sz="1400" dirty="0" smtClean="0">
+                <a:solidFill>
+                  <a:srgbClr val="FF0000"/>
+                </a:solidFill>
+              </a:rPr>
+            </a:br>
+            <a:r>
+              <a:rPr lang="pt-BR" sz="1400" dirty="0" smtClean="0">
+                <a:solidFill>
+                  <a:srgbClr val="00B050"/>
+                </a:solidFill>
+              </a:rPr>
+              <a:t>OK</a:t>
+            </a:r>
+          </a:p>
+          <a:p>
+            <a:endParaRPr lang="pt-BR" dirty="0">
+              <a:solidFill>
+                <a:srgbClr val="FF0000"/>
+              </a:solidFill>
+            </a:endParaRPr>
+          </a:p>
+        </p:txBody>
+      </p:sp>
+      <p:sp>
+        <p:nvSpPr>
+          <p:cNvPr id="9" name="CaixaDeTexto 8">
+            <a:extLst>
+              <a:ext uri="{FF2B5EF4-FFF2-40B4-BE49-F238E27FC236}">
+                <a16:creationId xmlns:a16="http://schemas.microsoft.com/office/drawing/2014/main" id="{D7CE3CBF-66CB-45CF-9138-3B8A991007FC}"/>
+              </a:ext>
+            </a:extLst>
+          </p:cNvPr>
+          <p:cNvSpPr txBox="1"/>
+          <p:nvPr/>
+        </p:nvSpPr>
+        <p:spPr>
+          <a:xfrm>
+            <a:off x="6195878" y="5666823"/>
+            <a:ext cx="5889322" cy="1107996"/>
+          </a:xfrm>
+          <a:prstGeom prst="rect">
+            <a:avLst/>
+          </a:prstGeom>
+          <a:noFill/>
+          <a:ln w="22225">
+            <a:solidFill>
+              <a:srgbClr val="FF0000"/>
+            </a:solidFill>
+          </a:ln>
+        </p:spPr>
+        <p:txBody>
+          <a:bodyPr wrap="square" rtlCol="0">
+            <a:spAutoFit/>
+          </a:bodyPr>
+          <a:lstStyle/>
+          <a:p>
+            <a:r>
+              <a:rPr lang="pt-BR" sz="1100" b="1" dirty="0" smtClean="0">
+                <a:solidFill>
+                  <a:srgbClr val="00B0F0"/>
+                </a:solidFill>
+              </a:rPr>
+              <a:t>====ARQUIVOS ALTERADOS====</a:t>
+            </a:r>
+          </a:p>
+          <a:p>
+            <a:endParaRPr lang="pt-BR" sz="1100" b="1" dirty="0" smtClean="0">
+              <a:solidFill>
+                <a:srgbClr val="00B0F0"/>
+              </a:solidFill>
+            </a:endParaRPr>
+          </a:p>
+          <a:p>
+            <a:r>
+              <a:rPr lang="pt-BR" sz="1100" b="1" dirty="0">
+                <a:solidFill>
+                  <a:srgbClr val="00B0F0"/>
+                </a:solidFill>
+              </a:rPr>
+              <a:t>WEB</a:t>
+            </a:r>
+          </a:p>
+          <a:p>
+            <a:r>
+              <a:rPr lang="pt-BR" sz="1100" b="1" dirty="0">
+                <a:solidFill>
+                  <a:srgbClr val="00B0F0"/>
+                </a:solidFill>
+              </a:rPr>
+              <a:t>containers_views.py</a:t>
+            </a:r>
+          </a:p>
+          <a:p>
+            <a:r>
+              <a:rPr lang="pt-BR" sz="1100" b="1" dirty="0">
+                <a:solidFill>
+                  <a:srgbClr val="00B0F0"/>
+                </a:solidFill>
+              </a:rPr>
+              <a:t>deployments.html</a:t>
+            </a:r>
+          </a:p>
+          <a:p>
+            <a:r>
+              <a:rPr lang="pt-BR" sz="1100" b="1" dirty="0">
+                <a:solidFill>
+                  <a:srgbClr val="00B0F0"/>
+                </a:solidFill>
+              </a:rPr>
+              <a:t>modal_log.html</a:t>
+            </a:r>
+            <a:endParaRPr lang="pt-BR" sz="1100" dirty="0">
+              <a:solidFill>
+                <a:srgbClr val="00B0F0"/>
+              </a:solidFill>
+            </a:endParaRPr>
           </a:p>
         </p:txBody>
       </p:sp>
@@ -9189,7 +9891,7 @@
         <p:spPr>
           <a:xfrm>
             <a:off x="424067" y="785276"/>
-            <a:ext cx="5671933" cy="4031873"/>
+            <a:ext cx="5671933" cy="4370427"/>
           </a:xfrm>
           <a:prstGeom prst="rect">
             <a:avLst/>
@@ -9221,12 +9923,12 @@
             </a:endParaRPr>
           </a:p>
           <a:p>
-            <a:pPr marL="457200" indent="-457200" algn="just">
+            <a:pPr marL="457200" indent="-457200">
               <a:buFont typeface="+mj-lt"/>
               <a:buAutoNum type="arabicParenR" startAt="4"/>
             </a:pPr>
             <a:r>
-              <a:rPr lang="pt-BR" dirty="0">
+              <a:rPr lang="pt-BR" sz="1400" dirty="0">
                 <a:solidFill>
                   <a:srgbClr val="FF0000"/>
                 </a:solidFill>
@@ -9234,7 +9936,7 @@
               <a:t>Acrescentar uma nova ação “</a:t>
             </a:r>
             <a:r>
-              <a:rPr lang="pt-BR" b="1" dirty="0">
+              <a:rPr lang="pt-BR" sz="1400" b="1" dirty="0">
                 <a:solidFill>
                   <a:srgbClr val="FF0000"/>
                 </a:solidFill>
@@ -9242,92 +9944,174 @@
               <a:t>Dados Administrativos</a:t>
             </a:r>
             <a:r>
-              <a:rPr lang="pt-BR" dirty="0">
-                <a:solidFill>
-                  <a:srgbClr val="FF0000"/>
-                </a:solidFill>
-              </a:rPr>
-              <a:t>”: deverá apresentar os somente dados abaixo do log de criação do Jenkins (vide exemplo ao lado)</a:t>
-            </a:r>
-          </a:p>
-          <a:p>
-            <a:pPr marL="457200" indent="-457200" algn="just">
-              <a:buFont typeface="+mj-lt"/>
-              <a:buAutoNum type="arabicParenR" startAt="4"/>
-            </a:pPr>
-            <a:endParaRPr lang="pt-BR" dirty="0">
+              <a:rPr lang="pt-BR" sz="1400" dirty="0">
+                <a:solidFill>
+                  <a:srgbClr val="FF0000"/>
+                </a:solidFill>
+              </a:rPr>
+              <a:t>”: deverá apresentar os somente dados abaixo do log de criação do Jenkins (vide exemplo ao lado) </a:t>
+            </a:r>
+            <a:br>
+              <a:rPr lang="pt-BR" sz="1400" dirty="0">
+                <a:solidFill>
+                  <a:srgbClr val="FF0000"/>
+                </a:solidFill>
+              </a:rPr>
+            </a:br>
+            <a:r>
+              <a:rPr lang="pt-BR" sz="1400" dirty="0">
+                <a:solidFill>
+                  <a:srgbClr val="00B050"/>
+                </a:solidFill>
+              </a:rPr>
+              <a:t>OK</a:t>
+            </a:r>
+            <a:endParaRPr lang="pt-BR" sz="1400" dirty="0">
               <a:solidFill>
                 <a:srgbClr val="FF0000"/>
               </a:solidFill>
             </a:endParaRPr>
           </a:p>
           <a:p>
-            <a:pPr marL="457200" indent="-457200" algn="just">
+            <a:pPr marL="457200" indent="-457200">
               <a:buFont typeface="+mj-lt"/>
               <a:buAutoNum type="arabicParenR" startAt="4"/>
             </a:pPr>
-            <a:r>
-              <a:rPr lang="pt-BR" dirty="0">
-                <a:solidFill>
-                  <a:srgbClr val="FF0000"/>
-                </a:solidFill>
-              </a:rPr>
-              <a:t>Coluna “</a:t>
-            </a:r>
-            <a:r>
-              <a:rPr lang="pt-BR" b="1" dirty="0">
-                <a:solidFill>
-                  <a:srgbClr val="FF0000"/>
-                </a:solidFill>
-              </a:rPr>
-              <a:t>Endereço da URL</a:t>
-            </a:r>
-            <a:r>
-              <a:rPr lang="pt-BR" dirty="0">
-                <a:solidFill>
-                  <a:srgbClr val="FF0000"/>
-                </a:solidFill>
-              </a:rPr>
-              <a:t>” deverá apresentar o valor do campo DNS que é retornado no log de criação de instância do Jenkins (vide exemplo ao lado). Se necessário, pode ser criado e gravado um novo campo no banco</a:t>
-            </a:r>
-          </a:p>
-          <a:p>
-            <a:pPr marL="457200" indent="-457200" algn="just">
+            <a:endParaRPr lang="pt-BR" sz="1400" dirty="0">
+              <a:solidFill>
+                <a:srgbClr val="FF0000"/>
+              </a:solidFill>
+            </a:endParaRPr>
+          </a:p>
+          <a:p>
+            <a:pPr marL="457200" indent="-457200">
               <a:buFont typeface="+mj-lt"/>
               <a:buAutoNum type="arabicParenR" startAt="4"/>
             </a:pPr>
             <a:r>
-              <a:rPr lang="pt-BR" dirty="0">
-                <a:solidFill>
-                  <a:srgbClr val="FF0000"/>
-                </a:solidFill>
-              </a:rPr>
-              <a:t>Apagar a ação “</a:t>
-            </a:r>
-            <a:r>
-              <a:rPr lang="pt-BR" b="1" dirty="0" err="1">
-                <a:solidFill>
-                  <a:srgbClr val="FF0000"/>
-                </a:solidFill>
-              </a:rPr>
-              <a:t>Rollback</a:t>
-            </a:r>
-            <a:r>
-              <a:rPr lang="pt-BR" dirty="0">
-                <a:solidFill>
-                  <a:srgbClr val="FF0000"/>
-                </a:solidFill>
-              </a:rPr>
-              <a:t>”</a:t>
-            </a:r>
-          </a:p>
-          <a:p>
-            <a:pPr marL="457200" indent="-457200" algn="just">
+              <a:rPr lang="pt-BR" sz="1400" dirty="0">
+                <a:solidFill>
+                  <a:srgbClr val="FF0000"/>
+                </a:solidFill>
+              </a:rPr>
+              <a:t>Coluna “</a:t>
+            </a:r>
+            <a:r>
+              <a:rPr lang="pt-BR" sz="1400" b="1" dirty="0">
+                <a:solidFill>
+                  <a:srgbClr val="FF0000"/>
+                </a:solidFill>
+              </a:rPr>
+              <a:t>Endereço da URL</a:t>
+            </a:r>
+            <a:r>
+              <a:rPr lang="pt-BR" sz="1400" dirty="0">
+                <a:solidFill>
+                  <a:srgbClr val="FF0000"/>
+                </a:solidFill>
+              </a:rPr>
+              <a:t>” deverá apresentar o valor do campo DNS que é retornado no log de criação de instância do Jenkins (vide exemplo ao lado). Se necessário, pode ser criado e gravado um novo campo no banco</a:t>
+            </a:r>
+            <a:br>
+              <a:rPr lang="pt-BR" sz="1400" dirty="0">
+                <a:solidFill>
+                  <a:srgbClr val="FF0000"/>
+                </a:solidFill>
+              </a:rPr>
+            </a:br>
+            <a:r>
+              <a:rPr lang="pt-BR" sz="1400" dirty="0" smtClean="0">
+                <a:solidFill>
+                  <a:srgbClr val="00B050"/>
+                </a:solidFill>
+              </a:rPr>
+              <a:t>OK</a:t>
+            </a:r>
+            <a:r>
+              <a:rPr lang="pt-BR" sz="1400" dirty="0" smtClean="0">
+                <a:solidFill>
+                  <a:srgbClr val="FF0000"/>
+                </a:solidFill>
+              </a:rPr>
+              <a:t/>
+            </a:r>
+            <a:br>
+              <a:rPr lang="pt-BR" sz="1400" dirty="0" smtClean="0">
+                <a:solidFill>
+                  <a:srgbClr val="FF0000"/>
+                </a:solidFill>
+              </a:rPr>
+            </a:br>
+            <a:endParaRPr lang="pt-BR" sz="1400" dirty="0">
+              <a:solidFill>
+                <a:srgbClr val="FF0000"/>
+              </a:solidFill>
+            </a:endParaRPr>
+          </a:p>
+          <a:p>
+            <a:pPr marL="457200" indent="-457200">
               <a:buFont typeface="+mj-lt"/>
               <a:buAutoNum type="arabicParenR" startAt="4"/>
             </a:pPr>
             <a:r>
-              <a:rPr lang="pt-BR" dirty="0">
+              <a:rPr lang="pt-BR" sz="1400" dirty="0">
+                <a:solidFill>
+                  <a:srgbClr val="FF0000"/>
+                </a:solidFill>
+              </a:rPr>
+              <a:t>Apagar a ação “</a:t>
+            </a:r>
+            <a:r>
+              <a:rPr lang="pt-BR" sz="1400" b="1" dirty="0" err="1">
+                <a:solidFill>
+                  <a:srgbClr val="FF0000"/>
+                </a:solidFill>
+              </a:rPr>
+              <a:t>Rollback</a:t>
+            </a:r>
+            <a:r>
+              <a:rPr lang="pt-BR" sz="1400" dirty="0" smtClean="0">
+                <a:solidFill>
+                  <a:srgbClr val="FF0000"/>
+                </a:solidFill>
+              </a:rPr>
+              <a:t>”</a:t>
+            </a:r>
+            <a:br>
+              <a:rPr lang="pt-BR" sz="1400" dirty="0" smtClean="0">
+                <a:solidFill>
+                  <a:srgbClr val="FF0000"/>
+                </a:solidFill>
+              </a:rPr>
+            </a:br>
+            <a:r>
+              <a:rPr lang="pt-BR" sz="1400" dirty="0" smtClean="0">
+                <a:solidFill>
+                  <a:srgbClr val="00B050"/>
+                </a:solidFill>
+              </a:rPr>
+              <a:t>OK</a:t>
+            </a:r>
+            <a:br>
+              <a:rPr lang="pt-BR" sz="1400" dirty="0" smtClean="0">
+                <a:solidFill>
+                  <a:srgbClr val="00B050"/>
+                </a:solidFill>
+              </a:rPr>
+            </a:br>
+            <a:endParaRPr lang="pt-BR" sz="1400" dirty="0">
+              <a:solidFill>
+                <a:srgbClr val="00B050"/>
+              </a:solidFill>
+            </a:endParaRPr>
+          </a:p>
+          <a:p>
+            <a:pPr marL="457200" indent="-457200">
+              <a:buFont typeface="+mj-lt"/>
+              <a:buAutoNum type="arabicParenR" startAt="4"/>
+            </a:pPr>
+            <a:r>
+              <a:rPr lang="pt-BR" sz="1400" dirty="0">
                 <a:solidFill>
                   <a:srgbClr val="FF0000"/>
                 </a:solidFill>
@@ -9335,7 +10119,7 @@
               <a:t>Acrescentar a coluna “</a:t>
             </a:r>
             <a:r>
-              <a:rPr lang="pt-BR" b="1" dirty="0">
+              <a:rPr lang="pt-BR" sz="1400" b="1" dirty="0">
                 <a:solidFill>
                   <a:srgbClr val="FF0000"/>
                 </a:solidFill>
@@ -9343,7 +10127,7 @@
               <a:t>Status</a:t>
             </a:r>
             <a:r>
-              <a:rPr lang="pt-BR" dirty="0">
+              <a:rPr lang="pt-BR" sz="1400" dirty="0">
                 <a:solidFill>
                   <a:srgbClr val="FF0000"/>
                 </a:solidFill>
@@ -9351,7 +10135,7 @@
               <a:t>” que deverá apresentar as </a:t>
             </a:r>
             <a:r>
-              <a:rPr lang="pt-BR" dirty="0" err="1">
+              <a:rPr lang="pt-BR" sz="1400" dirty="0" err="1">
                 <a:solidFill>
                   <a:srgbClr val="FF0000"/>
                 </a:solidFill>
@@ -9359,7 +10143,7 @@
               <a:t>strings</a:t>
             </a:r>
             <a:r>
-              <a:rPr lang="pt-BR" dirty="0">
+              <a:rPr lang="pt-BR" sz="1400" dirty="0">
                 <a:solidFill>
                   <a:srgbClr val="FF0000"/>
                 </a:solidFill>
@@ -9367,7 +10151,7 @@
               <a:t> “</a:t>
             </a:r>
             <a:r>
-              <a:rPr lang="pt-BR" b="1" dirty="0">
+              <a:rPr lang="pt-BR" sz="1400" b="1" dirty="0">
                 <a:solidFill>
                   <a:srgbClr val="FF0000"/>
                 </a:solidFill>
@@ -9375,7 +10159,7 @@
               <a:t>Ativa</a:t>
             </a:r>
             <a:r>
-              <a:rPr lang="pt-BR" dirty="0">
+              <a:rPr lang="pt-BR" sz="1400" dirty="0">
                 <a:solidFill>
                   <a:srgbClr val="FF0000"/>
                 </a:solidFill>
@@ -9383,7 +10167,7 @@
               <a:t>” e “</a:t>
             </a:r>
             <a:r>
-              <a:rPr lang="pt-BR" b="1" dirty="0">
+              <a:rPr lang="pt-BR" sz="1400" b="1" dirty="0">
                 <a:solidFill>
                   <a:srgbClr val="FF0000"/>
                 </a:solidFill>
@@ -9391,13 +10175,33 @@
               <a:t>Desativada</a:t>
             </a:r>
             <a:r>
-              <a:rPr lang="pt-BR" dirty="0">
+              <a:rPr lang="pt-BR" sz="1400" dirty="0">
                 <a:solidFill>
                   <a:srgbClr val="FF0000"/>
                 </a:solidFill>
               </a:rPr>
               <a:t>” conforme o botão </a:t>
             </a:r>
+            <a:br>
+              <a:rPr lang="pt-BR" sz="1400" dirty="0">
+                <a:solidFill>
+                  <a:srgbClr val="FF0000"/>
+                </a:solidFill>
+              </a:rPr>
+            </a:br>
+            <a:r>
+              <a:rPr lang="pt-BR" sz="1400" dirty="0" smtClean="0">
+                <a:solidFill>
+                  <a:srgbClr val="00B050"/>
+                </a:solidFill>
+              </a:rPr>
+              <a:t>OK</a:t>
+            </a:r>
+            <a:endParaRPr lang="pt-BR" sz="1400" dirty="0">
+              <a:solidFill>
+                <a:srgbClr val="FF0000"/>
+              </a:solidFill>
+            </a:endParaRPr>
           </a:p>
         </p:txBody>
       </p:sp>
@@ -9607,6 +10411,92 @@
           </a:prstGeom>
         </p:spPr>
       </p:pic>
+      <p:sp>
+        <p:nvSpPr>
+          <p:cNvPr id="10" name="CaixaDeTexto 9">
+            <a:extLst>
+              <a:ext uri="{FF2B5EF4-FFF2-40B4-BE49-F238E27FC236}">
+                <a16:creationId xmlns:a16="http://schemas.microsoft.com/office/drawing/2014/main" id="{D7CE3CBF-66CB-45CF-9138-3B8A991007FC}"/>
+              </a:ext>
+            </a:extLst>
+          </p:cNvPr>
+          <p:cNvSpPr txBox="1"/>
+          <p:nvPr/>
+        </p:nvSpPr>
+        <p:spPr>
+          <a:xfrm>
+            <a:off x="6523030" y="4408318"/>
+            <a:ext cx="4724400" cy="938719"/>
+          </a:xfrm>
+          <a:prstGeom prst="rect">
+            <a:avLst/>
+          </a:prstGeom>
+          <a:noFill/>
+          <a:ln w="22225">
+            <a:solidFill>
+              <a:srgbClr val="FF0000"/>
+            </a:solidFill>
+          </a:ln>
+        </p:spPr>
+        <p:txBody>
+          <a:bodyPr wrap="square" rtlCol="0">
+            <a:spAutoFit/>
+          </a:bodyPr>
+          <a:lstStyle/>
+          <a:p>
+            <a:r>
+              <a:rPr lang="pt-BR" sz="1100" b="1" dirty="0" smtClean="0">
+                <a:solidFill>
+                  <a:srgbClr val="00B0F0"/>
+                </a:solidFill>
+              </a:rPr>
+              <a:t>====ARQUIVOS ALTERADOS====</a:t>
+            </a:r>
+          </a:p>
+          <a:p>
+            <a:endParaRPr lang="pt-BR" sz="1100" b="1" dirty="0">
+              <a:solidFill>
+                <a:srgbClr val="00B0F0"/>
+              </a:solidFill>
+            </a:endParaRPr>
+          </a:p>
+          <a:p>
+            <a:r>
+              <a:rPr lang="pt-BR" sz="1100" b="1" dirty="0">
+                <a:solidFill>
+                  <a:srgbClr val="00B0F0"/>
+                </a:solidFill>
+              </a:rPr>
+              <a:t>WEB</a:t>
+            </a:r>
+          </a:p>
+          <a:p>
+            <a:r>
+              <a:rPr lang="pt-BR" sz="1100" b="1" dirty="0">
+                <a:solidFill>
+                  <a:srgbClr val="00B0F0"/>
+                </a:solidFill>
+              </a:rPr>
+              <a:t>deployments.html</a:t>
+            </a:r>
+          </a:p>
+          <a:p>
+            <a:r>
+              <a:rPr lang="pt-BR" sz="1100" b="1" dirty="0">
+                <a:solidFill>
+                  <a:srgbClr val="00B0F0"/>
+                </a:solidFill>
+              </a:rPr>
+              <a:t>list_containers.js</a:t>
+            </a:r>
+            <a:endParaRPr lang="pt-BR" sz="1100" dirty="0">
+              <a:solidFill>
+                <a:srgbClr val="00B0F0"/>
+              </a:solidFill>
+            </a:endParaRPr>
+          </a:p>
+        </p:txBody>
+      </p:sp>
     </p:spTree>
     <p:extLst>
       <p:ext uri="{BB962C8B-B14F-4D97-AF65-F5344CB8AC3E}">
@@ -9706,7 +10596,7 @@
         <p:spPr>
           <a:xfrm>
             <a:off x="424067" y="785276"/>
-            <a:ext cx="5671933" cy="2923877"/>
+            <a:ext cx="5671933" cy="3754874"/>
           </a:xfrm>
           <a:prstGeom prst="rect">
             <a:avLst/>
@@ -9738,7 +10628,7 @@
             </a:endParaRPr>
           </a:p>
           <a:p>
-            <a:pPr marL="457200" indent="-457200" algn="just">
+            <a:pPr marL="457200" indent="-457200">
               <a:buFont typeface="+mj-lt"/>
               <a:buAutoNum type="arabicParenR"/>
             </a:pPr>
@@ -9780,11 +10670,54 @@
                   <a:srgbClr val="FF0000"/>
                 </a:solidFill>
               </a:rPr>
-              <a:t> do grid esta invertido</a:t>
-            </a:r>
-          </a:p>
-          <a:p>
-            <a:pPr marL="457200" indent="-457200" algn="just">
+              <a:t> do grid esta </a:t>
+            </a:r>
+            <a:r>
+              <a:rPr lang="pt-BR" dirty="0" smtClean="0">
+                <a:solidFill>
+                  <a:srgbClr val="FF0000"/>
+                </a:solidFill>
+              </a:rPr>
+              <a:t>invertido</a:t>
+            </a:r>
+            <a:br>
+              <a:rPr lang="pt-BR" dirty="0" smtClean="0">
+                <a:solidFill>
+                  <a:srgbClr val="FF0000"/>
+                </a:solidFill>
+              </a:rPr>
+            </a:br>
+            <a:r>
+              <a:rPr lang="pt-BR" dirty="0" smtClean="0">
+                <a:solidFill>
+                  <a:srgbClr val="00B050"/>
+                </a:solidFill>
+              </a:rPr>
+              <a:t>OK</a:t>
+            </a:r>
+            <a:r>
+              <a:rPr lang="pt-BR" dirty="0" smtClean="0">
+                <a:solidFill>
+                  <a:srgbClr val="FF0000"/>
+                </a:solidFill>
+              </a:rPr>
+              <a:t/>
+            </a:r>
+            <a:br>
+              <a:rPr lang="pt-BR" dirty="0" smtClean="0">
+                <a:solidFill>
+                  <a:srgbClr val="FF0000"/>
+                </a:solidFill>
+              </a:rPr>
+            </a:br>
+            <a:endParaRPr lang="pt-BR" dirty="0">
+              <a:solidFill>
+                <a:srgbClr val="FF0000"/>
+              </a:solidFill>
+            </a:endParaRPr>
+          </a:p>
+          <a:p>
+            <a:pPr marL="457200" indent="-457200">
               <a:buFont typeface="+mj-lt"/>
               <a:buAutoNum type="arabicParenR"/>
             </a:pPr>
@@ -9798,7 +10731,7 @@
             </a:r>
           </a:p>
           <a:p>
-            <a:pPr marL="914400" lvl="1" indent="-457200" algn="just">
+            <a:pPr marL="914400" lvl="1" indent="-457200">
               <a:buFont typeface="+mj-lt"/>
               <a:buAutoNum type="alphaLcParenR"/>
             </a:pPr>
@@ -9812,7 +10745,7 @@
             </a:r>
           </a:p>
           <a:p>
-            <a:pPr marL="914400" lvl="1" indent="-457200" algn="just">
+            <a:pPr marL="914400" lvl="1" indent="-457200">
               <a:buFont typeface="+mj-lt"/>
               <a:buAutoNum type="alphaLcParenR"/>
             </a:pPr>
@@ -9826,7 +10759,7 @@
             </a:r>
           </a:p>
           <a:p>
-            <a:pPr marL="914400" lvl="1" indent="-457200" algn="just">
+            <a:pPr marL="914400" lvl="1" indent="-457200">
               <a:buFont typeface="+mj-lt"/>
               <a:buAutoNum type="alphaLcParenR"/>
             </a:pPr>
@@ -9840,18 +10773,118 @@
             </a:r>
           </a:p>
           <a:p>
-            <a:pPr marL="914400" lvl="1" indent="-457200" algn="just">
+            <a:pPr marL="914400" lvl="1" indent="-457200">
               <a:buFont typeface="+mj-lt"/>
               <a:buAutoNum type="alphaLcParenR"/>
             </a:pPr>
             <a:r>
-              <a:rPr lang="pt-BR" dirty="0">
-                <a:solidFill>
-                  <a:srgbClr val="FF0000"/>
-                </a:solidFill>
-              </a:rPr>
-              <a:t>Ações </a:t>
-            </a:r>
+              <a:rPr lang="pt-BR" dirty="0" smtClean="0">
+                <a:solidFill>
+                  <a:srgbClr val="FF0000"/>
+                </a:solidFill>
+              </a:rPr>
+              <a:t>Ações</a:t>
+            </a:r>
+          </a:p>
+          <a:p>
+            <a:pPr lvl="1"/>
+            <a:r>
+              <a:rPr lang="pt-BR" dirty="0" smtClean="0">
+                <a:solidFill>
+                  <a:srgbClr val="00B050"/>
+                </a:solidFill>
+              </a:rPr>
+              <a:t>OK</a:t>
+            </a:r>
+            <a:endParaRPr lang="pt-BR" dirty="0">
+              <a:solidFill>
+                <a:srgbClr val="FF0000"/>
+              </a:solidFill>
+            </a:endParaRPr>
+          </a:p>
+        </p:txBody>
+      </p:sp>
+      <p:sp>
+        <p:nvSpPr>
+          <p:cNvPr id="5" name="CaixaDeTexto 4">
+            <a:extLst>
+              <a:ext uri="{FF2B5EF4-FFF2-40B4-BE49-F238E27FC236}">
+                <a16:creationId xmlns:a16="http://schemas.microsoft.com/office/drawing/2014/main" id="{D7CE3CBF-66CB-45CF-9138-3B8A991007FC}"/>
+              </a:ext>
+            </a:extLst>
+          </p:cNvPr>
+          <p:cNvSpPr txBox="1"/>
+          <p:nvPr/>
+        </p:nvSpPr>
+        <p:spPr>
+          <a:xfrm>
+            <a:off x="897833" y="4540150"/>
+            <a:ext cx="4724400" cy="769441"/>
+          </a:xfrm>
+          <a:prstGeom prst="rect">
+            <a:avLst/>
+          </a:prstGeom>
+          <a:noFill/>
+          <a:ln w="22225">
+            <a:solidFill>
+              <a:srgbClr val="FF0000"/>
+            </a:solidFill>
+          </a:ln>
+        </p:spPr>
+        <p:txBody>
+          <a:bodyPr wrap="square" rtlCol="0">
+            <a:spAutoFit/>
+          </a:bodyPr>
+          <a:lstStyle/>
+          <a:p>
+            <a:r>
+              <a:rPr lang="pt-BR" sz="1100" b="1" dirty="0" smtClean="0">
+                <a:solidFill>
+                  <a:srgbClr val="00B0F0"/>
+                </a:solidFill>
+              </a:rPr>
+              <a:t>====ARQUIVOS ALTERADOS====</a:t>
+            </a:r>
+          </a:p>
+          <a:p>
+            <a:endParaRPr lang="pt-BR" sz="1100" b="1" dirty="0">
+              <a:solidFill>
+                <a:srgbClr val="00B0F0"/>
+              </a:solidFill>
+            </a:endParaRPr>
+          </a:p>
+          <a:p>
+            <a:r>
+              <a:rPr lang="pt-BR" sz="1100" b="1" dirty="0">
+                <a:solidFill>
+                  <a:srgbClr val="00B0F0"/>
+                </a:solidFill>
+              </a:rPr>
+              <a:t>WEB</a:t>
+            </a:r>
+          </a:p>
+          <a:p>
+            <a:r>
+              <a:rPr lang="pt-BR" sz="1100" b="1" dirty="0" err="1">
+                <a:solidFill>
+                  <a:srgbClr val="00B0F0"/>
+                </a:solidFill>
+              </a:rPr>
+              <a:t>images</a:t>
+            </a:r>
+            <a:r>
+              <a:rPr lang="pt-BR" sz="1100" b="1" dirty="0">
+                <a:solidFill>
+                  <a:srgbClr val="00B0F0"/>
+                </a:solidFill>
+              </a:rPr>
+              <a:t>/index.html</a:t>
+            </a:r>
+            <a:endParaRPr lang="pt-BR" sz="1100" dirty="0">
+              <a:solidFill>
+                <a:srgbClr val="00B0F0"/>
+              </a:solidFill>
+            </a:endParaRPr>
           </a:p>
         </p:txBody>
       </p:sp>
@@ -9940,7 +10973,7 @@
         <p:spPr>
           <a:xfrm>
             <a:off x="424067" y="785276"/>
-            <a:ext cx="5671933" cy="5724644"/>
+            <a:ext cx="5671933" cy="3046988"/>
           </a:xfrm>
           <a:prstGeom prst="rect">
             <a:avLst/>
@@ -9955,12 +10988,361 @@
           <a:p>
             <a:pPr algn="just"/>
             <a:r>
+              <a:rPr lang="pt-BR" sz="1200" b="1" dirty="0">
+                <a:solidFill>
+                  <a:srgbClr val="FF0000"/>
+                </a:solidFill>
+              </a:rPr>
+              <a:t>Pontos a desenvolver:</a:t>
+            </a:r>
+          </a:p>
+          <a:p>
+            <a:pPr algn="just"/>
+            <a:endParaRPr lang="pt-BR" sz="1200" b="1" dirty="0">
+              <a:solidFill>
+                <a:srgbClr val="FF0000"/>
+              </a:solidFill>
+            </a:endParaRPr>
+          </a:p>
+          <a:p>
+            <a:pPr algn="just"/>
+            <a:r>
+              <a:rPr lang="pt-BR" sz="1200" dirty="0">
+                <a:solidFill>
+                  <a:srgbClr val="FF0000"/>
+                </a:solidFill>
+              </a:rPr>
+              <a:t>Para cada funcionalidade do sistema deverá gerar um log com o que o usuário executou com os seguintes dados:</a:t>
+            </a:r>
+          </a:p>
+          <a:p>
+            <a:pPr marL="914400" lvl="1" indent="-457200" algn="just">
+              <a:buAutoNum type="alphaLcParenR"/>
+            </a:pPr>
+            <a:r>
+              <a:rPr lang="pt-BR" sz="1200" dirty="0">
+                <a:solidFill>
+                  <a:srgbClr val="FF0000"/>
+                </a:solidFill>
+              </a:rPr>
+              <a:t>Usuário (usuário </a:t>
+            </a:r>
+            <a:r>
+              <a:rPr lang="pt-BR" sz="1200" dirty="0" err="1">
+                <a:solidFill>
+                  <a:srgbClr val="FF0000"/>
+                </a:solidFill>
+              </a:rPr>
+              <a:t>logado</a:t>
+            </a:r>
+            <a:r>
+              <a:rPr lang="pt-BR" sz="1200" dirty="0">
+                <a:solidFill>
+                  <a:srgbClr val="FF0000"/>
+                </a:solidFill>
+              </a:rPr>
+              <a:t>)</a:t>
+            </a:r>
+          </a:p>
+          <a:p>
+            <a:pPr marL="914400" lvl="1" indent="-457200" algn="just">
+              <a:buAutoNum type="alphaLcParenR"/>
+            </a:pPr>
+            <a:r>
+              <a:rPr lang="pt-BR" sz="1200" dirty="0">
+                <a:solidFill>
+                  <a:srgbClr val="FF0000"/>
+                </a:solidFill>
+              </a:rPr>
+              <a:t>Data e Hora (</a:t>
+            </a:r>
+            <a:r>
+              <a:rPr lang="pt-BR" sz="1200" dirty="0" err="1">
+                <a:solidFill>
+                  <a:srgbClr val="FF0000"/>
+                </a:solidFill>
+              </a:rPr>
+              <a:t>timestamp</a:t>
+            </a:r>
+            <a:r>
+              <a:rPr lang="pt-BR" sz="1200" dirty="0">
+                <a:solidFill>
+                  <a:srgbClr val="FF0000"/>
+                </a:solidFill>
+              </a:rPr>
+              <a:t>)</a:t>
+            </a:r>
+          </a:p>
+          <a:p>
+            <a:pPr marL="914400" lvl="1" indent="-457200" algn="just">
+              <a:buAutoNum type="alphaLcParenR"/>
+            </a:pPr>
+            <a:r>
+              <a:rPr lang="pt-BR" sz="1200" dirty="0">
+                <a:solidFill>
+                  <a:srgbClr val="FF0000"/>
+                </a:solidFill>
+              </a:rPr>
+              <a:t>Ação (descrito abaixo</a:t>
+            </a:r>
+            <a:r>
+              <a:rPr lang="pt-BR" sz="1200" dirty="0" smtClean="0">
+                <a:solidFill>
+                  <a:srgbClr val="FF0000"/>
+                </a:solidFill>
+              </a:rPr>
+              <a:t>)</a:t>
+            </a:r>
+          </a:p>
+          <a:p>
+            <a:pPr lvl="1" algn="just"/>
+            <a:r>
+              <a:rPr lang="pt-BR" sz="1200" dirty="0" smtClean="0">
+                <a:solidFill>
+                  <a:srgbClr val="00B050"/>
+                </a:solidFill>
+              </a:rPr>
+              <a:t>OK</a:t>
+            </a:r>
+            <a:endParaRPr lang="pt-BR" sz="1200" dirty="0">
+              <a:solidFill>
+                <a:srgbClr val="00B050"/>
+              </a:solidFill>
+            </a:endParaRPr>
+          </a:p>
+          <a:p>
+            <a:pPr algn="just"/>
+            <a:endParaRPr lang="pt-BR" sz="1200" dirty="0">
+              <a:solidFill>
+                <a:srgbClr val="FF0000"/>
+              </a:solidFill>
+            </a:endParaRPr>
+          </a:p>
+          <a:p>
+            <a:pPr algn="just"/>
+            <a:r>
+              <a:rPr lang="pt-BR" sz="1200" b="1" dirty="0">
+                <a:solidFill>
+                  <a:srgbClr val="FF0000"/>
+                </a:solidFill>
+              </a:rPr>
+              <a:t>Tipos de Ações:</a:t>
+            </a:r>
+          </a:p>
+          <a:p>
+            <a:pPr lvl="1" algn="just"/>
+            <a:r>
+              <a:rPr lang="pt-BR" sz="1200" dirty="0">
+                <a:solidFill>
+                  <a:srgbClr val="FF0000"/>
+                </a:solidFill>
+              </a:rPr>
+              <a:t>Criação de Instância: (Nome da Instância - variável) ) - </a:t>
+            </a:r>
+            <a:r>
+              <a:rPr lang="pt-BR" sz="1200" dirty="0" smtClean="0">
+                <a:solidFill>
+                  <a:srgbClr val="00B050"/>
+                </a:solidFill>
+              </a:rPr>
+              <a:t>OK</a:t>
+            </a:r>
+            <a:endParaRPr lang="pt-BR" sz="1200" dirty="0">
+              <a:solidFill>
+                <a:srgbClr val="FF0000"/>
+              </a:solidFill>
+            </a:endParaRPr>
+          </a:p>
+          <a:p>
+            <a:pPr lvl="1" algn="just"/>
+            <a:r>
+              <a:rPr lang="pt-BR" sz="1200" dirty="0">
+                <a:solidFill>
+                  <a:srgbClr val="FF0000"/>
+                </a:solidFill>
+              </a:rPr>
+              <a:t>Instância Ativada: (Nome da Instância - variável) ) - </a:t>
+            </a:r>
+            <a:r>
+              <a:rPr lang="pt-BR" sz="1200" dirty="0" smtClean="0">
+                <a:solidFill>
+                  <a:srgbClr val="00B050"/>
+                </a:solidFill>
+              </a:rPr>
+              <a:t>OK</a:t>
+            </a:r>
+            <a:endParaRPr lang="pt-BR" sz="1200" dirty="0">
+              <a:solidFill>
+                <a:srgbClr val="FF0000"/>
+              </a:solidFill>
+            </a:endParaRPr>
+          </a:p>
+          <a:p>
+            <a:pPr lvl="1" algn="just"/>
+            <a:r>
+              <a:rPr lang="pt-BR" sz="1200" dirty="0">
+                <a:solidFill>
+                  <a:srgbClr val="FF0000"/>
+                </a:solidFill>
+              </a:rPr>
+              <a:t>Instância Desativada: (Nome da Instância - variável) ) - </a:t>
+            </a:r>
+            <a:r>
+              <a:rPr lang="pt-BR" sz="1200" dirty="0" smtClean="0">
+                <a:solidFill>
+                  <a:srgbClr val="00B050"/>
+                </a:solidFill>
+              </a:rPr>
+              <a:t>OK</a:t>
+            </a:r>
+            <a:endParaRPr lang="pt-BR" sz="1200" dirty="0">
+              <a:solidFill>
+                <a:srgbClr val="FF0000"/>
+              </a:solidFill>
+            </a:endParaRPr>
+          </a:p>
+          <a:p>
+            <a:pPr lvl="1" algn="just"/>
+            <a:r>
+              <a:rPr lang="pt-BR" sz="1200" dirty="0" smtClean="0">
+                <a:solidFill>
+                  <a:srgbClr val="FF0000"/>
+                </a:solidFill>
+              </a:rPr>
+              <a:t>Atualização da Instância: (Nome da Instância - </a:t>
+            </a:r>
+            <a:r>
+              <a:rPr lang="pt-BR" sz="1200" dirty="0">
+                <a:solidFill>
+                  <a:srgbClr val="FF0000"/>
+                </a:solidFill>
+              </a:rPr>
+              <a:t>variável) ) - </a:t>
+            </a:r>
+            <a:r>
+              <a:rPr lang="pt-BR" sz="1200" dirty="0" smtClean="0">
+                <a:solidFill>
+                  <a:srgbClr val="00B050"/>
+                </a:solidFill>
+              </a:rPr>
+              <a:t>OK</a:t>
+            </a:r>
+            <a:endParaRPr lang="pt-BR" sz="1200" dirty="0" smtClean="0">
+              <a:solidFill>
+                <a:srgbClr val="FF0000"/>
+              </a:solidFill>
+            </a:endParaRPr>
+          </a:p>
+          <a:p>
+            <a:pPr lvl="1" algn="just"/>
+            <a:r>
+              <a:rPr lang="pt-BR" sz="1200" dirty="0" smtClean="0">
+                <a:solidFill>
+                  <a:srgbClr val="FF0000"/>
+                </a:solidFill>
+              </a:rPr>
+              <a:t>Criação </a:t>
+            </a:r>
+            <a:r>
+              <a:rPr lang="pt-BR" sz="1200" dirty="0">
+                <a:solidFill>
+                  <a:srgbClr val="FF0000"/>
+                </a:solidFill>
+              </a:rPr>
+              <a:t>de Imagem: (Nome da Imagem - variável</a:t>
+            </a:r>
+            <a:r>
+              <a:rPr lang="pt-BR" sz="1200" dirty="0" smtClean="0">
+                <a:solidFill>
+                  <a:srgbClr val="FF0000"/>
+                </a:solidFill>
+              </a:rPr>
+              <a:t>) - </a:t>
+            </a:r>
+            <a:r>
+              <a:rPr lang="pt-BR" sz="1200" dirty="0" smtClean="0">
+                <a:solidFill>
+                  <a:srgbClr val="00B050"/>
+                </a:solidFill>
+              </a:rPr>
+              <a:t>OK</a:t>
+            </a:r>
+            <a:endParaRPr lang="pt-BR" sz="1200" dirty="0">
+              <a:solidFill>
+                <a:srgbClr val="00B050"/>
+              </a:solidFill>
+            </a:endParaRPr>
+          </a:p>
+          <a:p>
+            <a:pPr lvl="1" algn="just"/>
+            <a:r>
+              <a:rPr lang="pt-BR" sz="1200" dirty="0">
+                <a:solidFill>
+                  <a:srgbClr val="FF0000"/>
+                </a:solidFill>
+              </a:rPr>
+              <a:t>Criação de Produto: (Nome do Produto - variável</a:t>
+            </a:r>
+            <a:r>
+              <a:rPr lang="pt-BR" sz="1200" dirty="0" smtClean="0">
+                <a:solidFill>
+                  <a:srgbClr val="FF0000"/>
+                </a:solidFill>
+              </a:rPr>
+              <a:t>) - </a:t>
+            </a:r>
+            <a:r>
+              <a:rPr lang="pt-BR" sz="1200" dirty="0" smtClean="0">
+                <a:solidFill>
+                  <a:srgbClr val="00B050"/>
+                </a:solidFill>
+              </a:rPr>
+              <a:t>OK</a:t>
+            </a:r>
+            <a:endParaRPr lang="pt-BR" sz="1200" dirty="0">
+              <a:solidFill>
+                <a:srgbClr val="00B050"/>
+              </a:solidFill>
+            </a:endParaRPr>
+          </a:p>
+        </p:txBody>
+      </p:sp>
+      <p:sp>
+        <p:nvSpPr>
+          <p:cNvPr id="5" name="CaixaDeTexto 4">
+            <a:extLst>
+              <a:ext uri="{FF2B5EF4-FFF2-40B4-BE49-F238E27FC236}">
+                <a16:creationId xmlns:a16="http://schemas.microsoft.com/office/drawing/2014/main" id="{DD5003B8-C3DC-4609-96DE-1CD894B27024}"/>
+              </a:ext>
+            </a:extLst>
+          </p:cNvPr>
+          <p:cNvSpPr txBox="1"/>
+          <p:nvPr/>
+        </p:nvSpPr>
+        <p:spPr>
+          <a:xfrm>
+            <a:off x="8334104" y="783664"/>
+            <a:ext cx="3633583" cy="5324535"/>
+          </a:xfrm>
+          <a:prstGeom prst="rect">
+            <a:avLst/>
+          </a:prstGeom>
+          <a:noFill/>
+        </p:spPr>
+        <p:txBody>
+          <a:bodyPr wrap="square" rtlCol="0">
+            <a:spAutoFit/>
+          </a:bodyPr>
+          <a:lstStyle/>
+          <a:p>
+            <a:pPr algn="just"/>
+            <a:r>
               <a:rPr lang="pt-BR" sz="2000" b="1" dirty="0">
                 <a:solidFill>
                   <a:srgbClr val="FF0000"/>
                 </a:solidFill>
               </a:rPr>
-              <a:t>Pontos a desenvolver:</a:t>
+              <a:t>Menu:</a:t>
             </a:r>
           </a:p>
           <a:p>
@@ -9979,78 +11361,116 @@
                   <a:srgbClr val="FF0000"/>
                 </a:solidFill>
               </a:rPr>
-              <a:t>Para cada funcionalidade do sistema deverá gerar um log com o que o usuário executou com os seguintes dados:</a:t>
-            </a:r>
-          </a:p>
-          <a:p>
-            <a:pPr marL="914400" lvl="1" indent="-457200" algn="just">
-              <a:buAutoNum type="alphaLcParenR"/>
-            </a:pPr>
+              <a:t>Menu deverá ficar com as opções conforme ao lado, são elas:</a:t>
+            </a:r>
+          </a:p>
+          <a:p>
+            <a:pPr algn="just"/>
             <a:r>
               <a:rPr lang="pt-BR" sz="2000" dirty="0">
                 <a:solidFill>
                   <a:srgbClr val="FF0000"/>
                 </a:solidFill>
               </a:rPr>
-              <a:t>Usuário (usuário </a:t>
-            </a:r>
-            <a:r>
-              <a:rPr lang="pt-BR" sz="2000" dirty="0" err="1">
-                <a:solidFill>
-                  <a:srgbClr val="FF0000"/>
-                </a:solidFill>
-              </a:rPr>
-              <a:t>logado</a:t>
-            </a:r>
+              <a:t>Instâncias</a:t>
+            </a:r>
+          </a:p>
+          <a:p>
+            <a:pPr algn="just"/>
             <a:r>
               <a:rPr lang="pt-BR" sz="2000" dirty="0">
                 <a:solidFill>
                   <a:srgbClr val="FF0000"/>
                 </a:solidFill>
               </a:rPr>
-              <a:t>)</a:t>
-            </a:r>
-          </a:p>
-          <a:p>
-            <a:pPr marL="914400" lvl="1" indent="-457200" algn="just">
-              <a:buAutoNum type="alphaLcParenR"/>
-            </a:pPr>
+              <a:t>Atualização em Massa</a:t>
+            </a:r>
+          </a:p>
+          <a:p>
+            <a:pPr algn="just"/>
             <a:r>
               <a:rPr lang="pt-BR" sz="2000" dirty="0">
                 <a:solidFill>
                   <a:srgbClr val="FF0000"/>
                 </a:solidFill>
               </a:rPr>
-              <a:t>Data e Hora (</a:t>
-            </a:r>
-            <a:r>
-              <a:rPr lang="pt-BR" sz="2000" dirty="0" err="1">
-                <a:solidFill>
-                  <a:srgbClr val="FF0000"/>
-                </a:solidFill>
-              </a:rPr>
-              <a:t>timestamp</a:t>
-            </a:r>
+              <a:t>Administrativo</a:t>
+            </a:r>
+          </a:p>
+          <a:p>
             <a:r>
               <a:rPr lang="pt-BR" sz="2000" dirty="0">
                 <a:solidFill>
                   <a:srgbClr val="FF0000"/>
                 </a:solidFill>
               </a:rPr>
-              <a:t>)</a:t>
-            </a:r>
-          </a:p>
-          <a:p>
-            <a:pPr marL="914400" lvl="1" indent="-457200" algn="just">
-              <a:buAutoNum type="alphaLcParenR"/>
-            </a:pPr>
+              <a:t>	Imagens</a:t>
+            </a:r>
+          </a:p>
+          <a:p>
             <a:r>
               <a:rPr lang="pt-BR" sz="2000" dirty="0">
                 <a:solidFill>
                   <a:srgbClr val="FF0000"/>
                 </a:solidFill>
               </a:rPr>
-              <a:t>Ação (descrito abaixo)</a:t>
+              <a:t>	Produto</a:t>
+            </a:r>
+          </a:p>
+          <a:p>
+            <a:r>
+              <a:rPr lang="pt-BR" sz="2000" dirty="0">
+                <a:solidFill>
+                  <a:srgbClr val="FF0000"/>
+                </a:solidFill>
+              </a:rPr>
+              <a:t>	Log do Sistema</a:t>
+            </a:r>
+            <a:r>
+              <a:rPr lang="pt-BR" sz="1200" b="1" dirty="0">
+                <a:solidFill>
+                  <a:srgbClr val="FF0000"/>
+                </a:solidFill>
+              </a:rPr>
+              <a:t> (Nova </a:t>
+            </a:r>
+            <a:r>
+              <a:rPr lang="pt-BR" sz="1200" b="1" dirty="0" smtClean="0">
+                <a:solidFill>
+                  <a:srgbClr val="FF0000"/>
+                </a:solidFill>
+              </a:rPr>
+              <a:t>opção)</a:t>
+            </a:r>
+            <a:endParaRPr lang="pt-BR" sz="2000" b="1" dirty="0" smtClean="0">
+              <a:solidFill>
+                <a:srgbClr val="FF0000"/>
+              </a:solidFill>
+            </a:endParaRPr>
+          </a:p>
+          <a:p>
+            <a:r>
+              <a:rPr lang="pt-BR" sz="2000" dirty="0" smtClean="0">
+                <a:solidFill>
+                  <a:srgbClr val="FF0000"/>
+                </a:solidFill>
+              </a:rPr>
+              <a:t>	Usuário</a:t>
+            </a:r>
+            <a:br>
+              <a:rPr lang="pt-BR" sz="2000" dirty="0" smtClean="0">
+                <a:solidFill>
+                  <a:srgbClr val="FF0000"/>
+                </a:solidFill>
+              </a:rPr>
+            </a:br>
+            <a:r>
+              <a:rPr lang="pt-BR" sz="2000" dirty="0" smtClean="0">
+                <a:solidFill>
+                  <a:srgbClr val="00B050"/>
+                </a:solidFill>
+              </a:rPr>
+              <a:t>OK</a:t>
             </a:r>
           </a:p>
           <a:p>
@@ -10064,321 +11484,43 @@
           <a:p>
             <a:pPr algn="just"/>
             <a:r>
-              <a:rPr lang="pt-BR" sz="2000" b="1" dirty="0">
-                <a:solidFill>
-                  <a:srgbClr val="FF0000"/>
-                </a:solidFill>
-              </a:rPr>
-              <a:t>Tipos de Ações:</a:t>
-            </a:r>
-          </a:p>
-          <a:p>
-            <a:pPr lvl="1" algn="just"/>
-            <a:r>
-              <a:rPr lang="pt-BR" dirty="0">
-                <a:solidFill>
-                  <a:srgbClr val="FF0000"/>
-                </a:solidFill>
-              </a:rPr>
-              <a:t>Criação de Instância: (Nome da Instância - variável)</a:t>
-            </a:r>
-          </a:p>
-          <a:p>
-            <a:pPr lvl="1" algn="just"/>
-            <a:r>
-              <a:rPr lang="pt-BR" dirty="0">
-                <a:solidFill>
-                  <a:srgbClr val="FF0000"/>
-                </a:solidFill>
-              </a:rPr>
-              <a:t>Instância Ativada: (Nome da Instância - variável)</a:t>
-            </a:r>
-          </a:p>
-          <a:p>
-            <a:pPr lvl="1" algn="just"/>
-            <a:r>
-              <a:rPr lang="pt-BR" dirty="0">
-                <a:solidFill>
-                  <a:srgbClr val="FF0000"/>
-                </a:solidFill>
-              </a:rPr>
-              <a:t>Instância Desativada: (Nome da Instância - variável)</a:t>
-            </a:r>
-          </a:p>
-          <a:p>
-            <a:pPr lvl="1" algn="just"/>
-            <a:r>
-              <a:rPr lang="pt-BR" dirty="0">
-                <a:solidFill>
-                  <a:srgbClr val="FF0000"/>
-                </a:solidFill>
-              </a:rPr>
-              <a:t>Atualização da Instância: </a:t>
-            </a:r>
-            <a:r>
-              <a:rPr lang="pt-BR" sz="1600" dirty="0">
-                <a:solidFill>
-                  <a:srgbClr val="FF0000"/>
-                </a:solidFill>
-              </a:rPr>
-              <a:t>(Nome da Instância - variável)</a:t>
-            </a:r>
-          </a:p>
-          <a:p>
-            <a:pPr lvl="1" algn="just"/>
-            <a:r>
-              <a:rPr lang="pt-BR" dirty="0">
-                <a:solidFill>
-                  <a:srgbClr val="FF0000"/>
-                </a:solidFill>
-              </a:rPr>
-              <a:t>Criação de Imagem: </a:t>
-            </a:r>
-            <a:r>
-              <a:rPr lang="pt-BR" sz="1600" dirty="0">
-                <a:solidFill>
-                  <a:srgbClr val="FF0000"/>
-                </a:solidFill>
-              </a:rPr>
-              <a:t>(Nome da Imagem - variável)</a:t>
-            </a:r>
-          </a:p>
-          <a:p>
-            <a:pPr lvl="1" algn="just"/>
-            <a:r>
-              <a:rPr lang="pt-BR" dirty="0">
-                <a:solidFill>
-                  <a:srgbClr val="FF0000"/>
-                </a:solidFill>
-              </a:rPr>
-              <a:t>Criação de Produto: </a:t>
-            </a:r>
-            <a:r>
-              <a:rPr lang="pt-BR" sz="1600" dirty="0">
-                <a:solidFill>
-                  <a:srgbClr val="FF0000"/>
-                </a:solidFill>
-              </a:rPr>
-              <a:t>(Nome do Produto - variável)</a:t>
-            </a:r>
-            <a:endParaRPr lang="pt-BR" dirty="0">
-              <a:solidFill>
-                <a:srgbClr val="FF0000"/>
-              </a:solidFill>
-            </a:endParaRPr>
-          </a:p>
-          <a:p>
-            <a:pPr lvl="1" algn="just"/>
-            <a:endParaRPr lang="pt-BR" dirty="0">
-              <a:solidFill>
-                <a:srgbClr val="FF0000"/>
-              </a:solidFill>
-            </a:endParaRPr>
+              <a:rPr lang="pt-BR" sz="2000" dirty="0">
+                <a:solidFill>
+                  <a:srgbClr val="FF0000"/>
+                </a:solidFill>
+              </a:rPr>
+              <a:t>Apagar a opção “</a:t>
+            </a:r>
+            <a:r>
+              <a:rPr lang="pt-BR" sz="2000" dirty="0" err="1">
+                <a:solidFill>
+                  <a:srgbClr val="FF0000"/>
+                </a:solidFill>
+              </a:rPr>
+              <a:t>Conteiners</a:t>
+            </a:r>
+            <a:r>
+              <a:rPr lang="pt-BR" sz="2000" dirty="0" smtClean="0">
+                <a:solidFill>
+                  <a:srgbClr val="FF0000"/>
+                </a:solidFill>
+              </a:rPr>
+              <a:t>”</a:t>
+            </a:r>
           </a:p>
           <a:p>
             <a:pPr algn="just"/>
+            <a:r>
+              <a:rPr lang="pt-BR" sz="2000" dirty="0" smtClean="0">
+                <a:solidFill>
+                  <a:srgbClr val="00B050"/>
+                </a:solidFill>
+              </a:rPr>
+              <a:t>OK</a:t>
+            </a:r>
             <a:endParaRPr lang="pt-BR" sz="2000" dirty="0">
               <a:solidFill>
-                <a:srgbClr val="FF0000"/>
-              </a:solidFill>
-            </a:endParaRPr>
-          </a:p>
-          <a:p>
-            <a:pPr marL="914400" lvl="1" indent="-457200" algn="just">
-              <a:buAutoNum type="alphaLcParenR"/>
-            </a:pPr>
-            <a:endParaRPr lang="pt-BR" sz="2000" dirty="0">
-              <a:solidFill>
-                <a:srgbClr val="FF0000"/>
-              </a:solidFill>
-            </a:endParaRPr>
-          </a:p>
-        </p:txBody>
-      </p:sp>
-      <p:sp>
-        <p:nvSpPr>
-          <p:cNvPr id="5" name="CaixaDeTexto 4">
-            <a:extLst>
-              <a:ext uri="{FF2B5EF4-FFF2-40B4-BE49-F238E27FC236}">
-                <a16:creationId xmlns:a16="http://schemas.microsoft.com/office/drawing/2014/main" id="{DD5003B8-C3DC-4609-96DE-1CD894B27024}"/>
-              </a:ext>
-            </a:extLst>
-          </p:cNvPr>
-          <p:cNvSpPr txBox="1"/>
-          <p:nvPr/>
-        </p:nvSpPr>
-        <p:spPr>
-          <a:xfrm>
-            <a:off x="8334104" y="783664"/>
-            <a:ext cx="3633583" cy="4708981"/>
-          </a:xfrm>
-          <a:prstGeom prst="rect">
-            <a:avLst/>
-          </a:prstGeom>
-          <a:noFill/>
-        </p:spPr>
-        <p:txBody>
-          <a:bodyPr wrap="square" rtlCol="0">
-            <a:spAutoFit/>
-          </a:bodyPr>
-          <a:lstStyle/>
-          <a:p>
-            <a:pPr algn="just"/>
-            <a:r>
-              <a:rPr lang="pt-BR" sz="2000" b="1" dirty="0">
-                <a:solidFill>
-                  <a:srgbClr val="FF0000"/>
-                </a:solidFill>
-              </a:rPr>
-              <a:t>Menu:</a:t>
-            </a:r>
-          </a:p>
-          <a:p>
-            <a:pPr algn="just"/>
-            <a:endParaRPr lang="pt-BR" sz="2000" b="1" dirty="0">
-              <a:solidFill>
-                <a:srgbClr val="FF0000"/>
-              </a:solidFill>
-            </a:endParaRPr>
-          </a:p>
-          <a:p>
-            <a:pPr algn="just"/>
-            <a:r>
-              <a:rPr lang="pt-BR" sz="2000" dirty="0">
-                <a:solidFill>
-                  <a:srgbClr val="FF0000"/>
-                </a:solidFill>
-              </a:rPr>
-              <a:t>Menu deverá ficar com as opções conforme ao lado, são elas:</a:t>
-            </a:r>
-          </a:p>
-          <a:p>
-            <a:pPr algn="just"/>
-            <a:r>
-              <a:rPr lang="pt-BR" sz="2000" dirty="0">
-                <a:solidFill>
-                  <a:srgbClr val="FF0000"/>
-                </a:solidFill>
-              </a:rPr>
-              <a:t>Instâncias</a:t>
-            </a:r>
-          </a:p>
-          <a:p>
-            <a:pPr algn="just"/>
-            <a:r>
-              <a:rPr lang="pt-BR" sz="2000" dirty="0">
-                <a:solidFill>
-                  <a:srgbClr val="FF0000"/>
-                </a:solidFill>
-              </a:rPr>
-              <a:t>Atualização em Massa</a:t>
-            </a:r>
-          </a:p>
-          <a:p>
-            <a:pPr algn="just"/>
-            <a:r>
-              <a:rPr lang="pt-BR" sz="2000" dirty="0">
-                <a:solidFill>
-                  <a:srgbClr val="FF0000"/>
-                </a:solidFill>
-              </a:rPr>
-              <a:t>Administrativo</a:t>
-            </a:r>
-          </a:p>
-          <a:p>
-            <a:pPr algn="just"/>
-            <a:r>
-              <a:rPr lang="pt-BR" sz="2000" dirty="0">
-                <a:solidFill>
-                  <a:srgbClr val="FF0000"/>
-                </a:solidFill>
-              </a:rPr>
-              <a:t>	Imagens</a:t>
-            </a:r>
-          </a:p>
-          <a:p>
-            <a:pPr algn="just"/>
-            <a:r>
-              <a:rPr lang="pt-BR" sz="2000" dirty="0">
-                <a:solidFill>
-                  <a:srgbClr val="FF0000"/>
-                </a:solidFill>
-              </a:rPr>
-              <a:t>	Produto</a:t>
-            </a:r>
-          </a:p>
-          <a:p>
-            <a:pPr algn="just"/>
-            <a:r>
-              <a:rPr lang="pt-BR" sz="2000" dirty="0">
-                <a:solidFill>
-                  <a:srgbClr val="FF0000"/>
-                </a:solidFill>
-              </a:rPr>
-              <a:t>	Log do Sistema</a:t>
-            </a:r>
-            <a:r>
-              <a:rPr lang="pt-BR" sz="1200" b="1" dirty="0">
-                <a:solidFill>
-                  <a:srgbClr val="FF0000"/>
-                </a:solidFill>
-              </a:rPr>
-              <a:t> (Nova opção)</a:t>
-            </a:r>
-            <a:endParaRPr lang="pt-BR" sz="2000" b="1" dirty="0">
-              <a:solidFill>
-                <a:srgbClr val="FF0000"/>
-              </a:solidFill>
-            </a:endParaRPr>
-          </a:p>
-          <a:p>
-            <a:pPr algn="just"/>
-            <a:r>
-              <a:rPr lang="pt-BR" sz="2000" dirty="0">
-                <a:solidFill>
-                  <a:srgbClr val="FF0000"/>
-                </a:solidFill>
-              </a:rPr>
-              <a:t>	Usuário</a:t>
-            </a:r>
-          </a:p>
-          <a:p>
-            <a:pPr algn="just"/>
-            <a:endParaRPr lang="pt-BR" sz="2000" dirty="0">
-              <a:solidFill>
-                <a:srgbClr val="FF0000"/>
-              </a:solidFill>
-            </a:endParaRPr>
-          </a:p>
-          <a:p>
-            <a:pPr algn="just"/>
-            <a:r>
-              <a:rPr lang="pt-BR" sz="2000" dirty="0">
-                <a:solidFill>
-                  <a:srgbClr val="FF0000"/>
-                </a:solidFill>
-              </a:rPr>
-              <a:t>Apagar a opção “</a:t>
-            </a:r>
-            <a:r>
-              <a:rPr lang="pt-BR" sz="2000" dirty="0" err="1">
-                <a:solidFill>
-                  <a:srgbClr val="FF0000"/>
-                </a:solidFill>
-              </a:rPr>
-              <a:t>Conteiners</a:t>
-            </a:r>
-            <a:r>
-              <a:rPr lang="pt-BR" sz="2000">
-                <a:solidFill>
-                  <a:srgbClr val="FF0000"/>
-                </a:solidFill>
-              </a:rPr>
-              <a:t>”</a:t>
-            </a:r>
-            <a:endParaRPr lang="pt-BR" sz="2000" dirty="0">
-              <a:solidFill>
-                <a:srgbClr val="FF0000"/>
+                <a:srgbClr val="00B050"/>
               </a:solidFill>
             </a:endParaRPr>
           </a:p>
@@ -10424,6 +11566,243 @@
           </a:prstGeom>
         </p:spPr>
       </p:pic>
+      <p:sp>
+        <p:nvSpPr>
+          <p:cNvPr id="6" name="CaixaDeTexto 5">
+            <a:extLst>
+              <a:ext uri="{FF2B5EF4-FFF2-40B4-BE49-F238E27FC236}">
+                <a16:creationId xmlns:a16="http://schemas.microsoft.com/office/drawing/2014/main" id="{D7CE3CBF-66CB-45CF-9138-3B8A991007FC}"/>
+              </a:ext>
+            </a:extLst>
+          </p:cNvPr>
+          <p:cNvSpPr txBox="1"/>
+          <p:nvPr/>
+        </p:nvSpPr>
+        <p:spPr>
+          <a:xfrm>
+            <a:off x="552179" y="3690248"/>
+            <a:ext cx="4724400" cy="3139321"/>
+          </a:xfrm>
+          <a:prstGeom prst="rect">
+            <a:avLst/>
+          </a:prstGeom>
+          <a:noFill/>
+          <a:ln w="22225">
+            <a:solidFill>
+              <a:srgbClr val="FF0000"/>
+            </a:solidFill>
+          </a:ln>
+        </p:spPr>
+        <p:txBody>
+          <a:bodyPr wrap="square" rtlCol="0">
+            <a:spAutoFit/>
+          </a:bodyPr>
+          <a:lstStyle/>
+          <a:p>
+            <a:r>
+              <a:rPr lang="pt-BR" sz="1100" b="1" dirty="0" smtClean="0">
+                <a:solidFill>
+                  <a:srgbClr val="00B0F0"/>
+                </a:solidFill>
+              </a:rPr>
+              <a:t>====ARQUIVOS ALTERADOS====</a:t>
+            </a:r>
+          </a:p>
+          <a:p>
+            <a:r>
+              <a:rPr lang="pt-BR" sz="1100" b="1" dirty="0" smtClean="0">
+                <a:solidFill>
+                  <a:srgbClr val="00B0F0"/>
+                </a:solidFill>
+              </a:rPr>
+              <a:t>API</a:t>
+            </a:r>
+          </a:p>
+          <a:p>
+            <a:r>
+              <a:rPr lang="pt-BR" sz="1100" b="1" dirty="0" smtClean="0">
+                <a:solidFill>
+                  <a:srgbClr val="00B0F0"/>
+                </a:solidFill>
+              </a:rPr>
+              <a:t>Log.py</a:t>
+            </a:r>
+          </a:p>
+          <a:p>
+            <a:r>
+              <a:rPr lang="pt-BR" sz="1100" b="1" dirty="0">
+                <a:solidFill>
+                  <a:srgbClr val="00B0F0"/>
+                </a:solidFill>
+              </a:rPr>
+              <a:t>App.py</a:t>
+            </a:r>
+          </a:p>
+          <a:p>
+            <a:r>
+              <a:rPr lang="pt-BR" sz="1100" b="1" dirty="0">
+                <a:solidFill>
+                  <a:srgbClr val="00B0F0"/>
+                </a:solidFill>
+              </a:rPr>
+              <a:t>__init__.py</a:t>
+            </a:r>
+          </a:p>
+          <a:p>
+            <a:endParaRPr lang="pt-BR" sz="1100" b="1" dirty="0">
+              <a:solidFill>
+                <a:srgbClr val="00B0F0"/>
+              </a:solidFill>
+            </a:endParaRPr>
+          </a:p>
+          <a:p>
+            <a:r>
+              <a:rPr lang="pt-BR" sz="1100" b="1" dirty="0">
+                <a:solidFill>
+                  <a:srgbClr val="00B0F0"/>
+                </a:solidFill>
+              </a:rPr>
+              <a:t>WEB</a:t>
+            </a:r>
+          </a:p>
+          <a:p>
+            <a:r>
+              <a:rPr lang="pt-BR" sz="1100" b="1" dirty="0" smtClean="0">
+                <a:solidFill>
+                  <a:srgbClr val="00B0F0"/>
+                </a:solidFill>
+              </a:rPr>
+              <a:t>Log.js</a:t>
+            </a:r>
+          </a:p>
+          <a:p>
+            <a:r>
+              <a:rPr lang="pt-BR" sz="1100" b="1" dirty="0" smtClean="0">
+                <a:solidFill>
+                  <a:srgbClr val="00B0F0"/>
+                </a:solidFill>
+              </a:rPr>
+              <a:t>Produtos.js</a:t>
+            </a:r>
+          </a:p>
+          <a:p>
+            <a:r>
+              <a:rPr lang="pt-BR" sz="1100" b="1" dirty="0" smtClean="0">
+                <a:solidFill>
+                  <a:srgbClr val="00B0F0"/>
+                </a:solidFill>
+              </a:rPr>
+              <a:t>Images.js</a:t>
+            </a:r>
+          </a:p>
+          <a:p>
+            <a:r>
+              <a:rPr lang="pt-BR" sz="1100" b="1" dirty="0" smtClean="0">
+                <a:solidFill>
+                  <a:srgbClr val="00B0F0"/>
+                </a:solidFill>
+              </a:rPr>
+              <a:t>List_containeres.js</a:t>
+            </a:r>
+          </a:p>
+          <a:p>
+            <a:r>
+              <a:rPr lang="pt-BR" sz="1100" b="1" dirty="0" smtClean="0">
+                <a:solidFill>
+                  <a:srgbClr val="00B0F0"/>
+                </a:solidFill>
+              </a:rPr>
+              <a:t>Containers_views.py</a:t>
+            </a:r>
+          </a:p>
+          <a:p>
+            <a:r>
+              <a:rPr lang="pt-BR" sz="1100" b="1" dirty="0" smtClean="0">
+                <a:solidFill>
+                  <a:srgbClr val="00B0F0"/>
+                </a:solidFill>
+              </a:rPr>
+              <a:t>Deployments.html</a:t>
+            </a:r>
+          </a:p>
+          <a:p>
+            <a:r>
+              <a:rPr lang="pt-BR" sz="1100" b="1" dirty="0" smtClean="0">
+                <a:solidFill>
+                  <a:srgbClr val="00B0F0"/>
+                </a:solidFill>
+              </a:rPr>
+              <a:t>Produto/Index.html</a:t>
+            </a:r>
+          </a:p>
+          <a:p>
+            <a:r>
+              <a:rPr lang="pt-BR" sz="1100" b="1" dirty="0" smtClean="0">
+                <a:solidFill>
+                  <a:srgbClr val="00B0F0"/>
+                </a:solidFill>
+              </a:rPr>
+              <a:t>Logs/Index.html</a:t>
+            </a:r>
+          </a:p>
+          <a:p>
+            <a:r>
+              <a:rPr lang="pt-BR" sz="1100" b="1" dirty="0" err="1" smtClean="0">
+                <a:solidFill>
+                  <a:srgbClr val="00B0F0"/>
+                </a:solidFill>
+              </a:rPr>
+              <a:t>Images</a:t>
+            </a:r>
+            <a:r>
+              <a:rPr lang="pt-BR" sz="1100" b="1" dirty="0" smtClean="0">
+                <a:solidFill>
+                  <a:srgbClr val="00B0F0"/>
+                </a:solidFill>
+              </a:rPr>
+              <a:t>/Index.html</a:t>
+            </a:r>
+          </a:p>
+          <a:p>
+            <a:r>
+              <a:rPr lang="pt-BR" sz="1100" b="1" dirty="0" err="1" smtClean="0">
+                <a:solidFill>
+                  <a:srgbClr val="00B0F0"/>
+                </a:solidFill>
+              </a:rPr>
+              <a:t>Templates</a:t>
+            </a:r>
+            <a:r>
+              <a:rPr lang="pt-BR" sz="1100" b="1" dirty="0" smtClean="0">
+                <a:solidFill>
+                  <a:srgbClr val="00B0F0"/>
+                </a:solidFill>
+              </a:rPr>
+              <a:t>/Index.html</a:t>
+            </a:r>
+            <a:endParaRPr lang="pt-BR" sz="1100" dirty="0">
+              <a:solidFill>
+                <a:srgbClr val="00B0F0"/>
+              </a:solidFill>
+            </a:endParaRPr>
+          </a:p>
+          <a:p>
+            <a:r>
+              <a:rPr lang="pt-BR" sz="1100" b="1" dirty="0" smtClean="0">
+                <a:solidFill>
+                  <a:srgbClr val="00B0F0"/>
+                </a:solidFill>
+              </a:rPr>
+              <a:t>Urls.py</a:t>
+            </a:r>
+            <a:endParaRPr lang="pt-BR" sz="1100" b="1" dirty="0">
+              <a:solidFill>
+                <a:srgbClr val="00B0F0"/>
+              </a:solidFill>
+            </a:endParaRPr>
+          </a:p>
+        </p:txBody>
+      </p:sp>
     </p:spTree>
     <p:extLst>
       <p:ext uri="{BB962C8B-B14F-4D97-AF65-F5344CB8AC3E}">

</xml_diff>